<commit_message>
examples for board layout/placement
</commit_message>
<xml_diff>
--- a/Lecture Slides/Lab01-Eagle-Intro.pptx
+++ b/Lecture Slides/Lab01-Eagle-Intro.pptx
@@ -236,7 +236,7 @@
           <a:p>
             <a:fld id="{BC745CAF-6697-EB43-8D33-148B2A11868D}" type="datetimeFigureOut">
               <a:rPr lang="en-US" smtClean="0"/>
-              <a:t>3/25/17</a:t>
+              <a:t>4/2/17</a:t>
             </a:fld>
             <a:endParaRPr lang="en-US"/>
           </a:p>
@@ -769,7 +769,7 @@
           <a:p>
             <a:fld id="{0675A308-8787-9B42-956E-CA40C2F0F6AE}" type="datetimeFigureOut">
               <a:rPr lang="en-US" smtClean="0"/>
-              <a:t>3/25/17</a:t>
+              <a:t>4/2/17</a:t>
             </a:fld>
             <a:endParaRPr lang="en-US"/>
           </a:p>
@@ -939,7 +939,7 @@
           <a:p>
             <a:fld id="{0675A308-8787-9B42-956E-CA40C2F0F6AE}" type="datetimeFigureOut">
               <a:rPr lang="en-US" smtClean="0"/>
-              <a:t>3/25/17</a:t>
+              <a:t>4/2/17</a:t>
             </a:fld>
             <a:endParaRPr lang="en-US"/>
           </a:p>
@@ -1119,7 +1119,7 @@
           <a:p>
             <a:fld id="{0675A308-8787-9B42-956E-CA40C2F0F6AE}" type="datetimeFigureOut">
               <a:rPr lang="en-US" smtClean="0"/>
-              <a:t>3/25/17</a:t>
+              <a:t>4/2/17</a:t>
             </a:fld>
             <a:endParaRPr lang="en-US"/>
           </a:p>
@@ -1289,7 +1289,7 @@
           <a:p>
             <a:fld id="{0675A308-8787-9B42-956E-CA40C2F0F6AE}" type="datetimeFigureOut">
               <a:rPr lang="en-US" smtClean="0"/>
-              <a:t>3/25/17</a:t>
+              <a:t>4/2/17</a:t>
             </a:fld>
             <a:endParaRPr lang="en-US"/>
           </a:p>
@@ -1535,7 +1535,7 @@
           <a:p>
             <a:fld id="{0675A308-8787-9B42-956E-CA40C2F0F6AE}" type="datetimeFigureOut">
               <a:rPr lang="en-US" smtClean="0"/>
-              <a:t>3/25/17</a:t>
+              <a:t>4/2/17</a:t>
             </a:fld>
             <a:endParaRPr lang="en-US"/>
           </a:p>
@@ -1823,7 +1823,7 @@
           <a:p>
             <a:fld id="{0675A308-8787-9B42-956E-CA40C2F0F6AE}" type="datetimeFigureOut">
               <a:rPr lang="en-US" smtClean="0"/>
-              <a:t>3/25/17</a:t>
+              <a:t>4/2/17</a:t>
             </a:fld>
             <a:endParaRPr lang="en-US"/>
           </a:p>
@@ -2245,7 +2245,7 @@
           <a:p>
             <a:fld id="{0675A308-8787-9B42-956E-CA40C2F0F6AE}" type="datetimeFigureOut">
               <a:rPr lang="en-US" smtClean="0"/>
-              <a:t>3/25/17</a:t>
+              <a:t>4/2/17</a:t>
             </a:fld>
             <a:endParaRPr lang="en-US"/>
           </a:p>
@@ -2363,7 +2363,7 @@
           <a:p>
             <a:fld id="{0675A308-8787-9B42-956E-CA40C2F0F6AE}" type="datetimeFigureOut">
               <a:rPr lang="en-US" smtClean="0"/>
-              <a:t>3/25/17</a:t>
+              <a:t>4/2/17</a:t>
             </a:fld>
             <a:endParaRPr lang="en-US"/>
           </a:p>
@@ -2458,7 +2458,7 @@
           <a:p>
             <a:fld id="{0675A308-8787-9B42-956E-CA40C2F0F6AE}" type="datetimeFigureOut">
               <a:rPr lang="en-US" smtClean="0"/>
-              <a:t>3/25/17</a:t>
+              <a:t>4/2/17</a:t>
             </a:fld>
             <a:endParaRPr lang="en-US"/>
           </a:p>
@@ -2735,7 +2735,7 @@
           <a:p>
             <a:fld id="{0675A308-8787-9B42-956E-CA40C2F0F6AE}" type="datetimeFigureOut">
               <a:rPr lang="en-US" smtClean="0"/>
-              <a:t>3/25/17</a:t>
+              <a:t>4/2/17</a:t>
             </a:fld>
             <a:endParaRPr lang="en-US"/>
           </a:p>
@@ -2988,7 +2988,7 @@
           <a:p>
             <a:fld id="{0675A308-8787-9B42-956E-CA40C2F0F6AE}" type="datetimeFigureOut">
               <a:rPr lang="en-US" smtClean="0"/>
-              <a:t>3/25/17</a:t>
+              <a:t>4/2/17</a:t>
             </a:fld>
             <a:endParaRPr lang="en-US"/>
           </a:p>
@@ -3201,7 +3201,7 @@
           <a:p>
             <a:fld id="{0675A308-8787-9B42-956E-CA40C2F0F6AE}" type="datetimeFigureOut">
               <a:rPr lang="en-US" smtClean="0"/>
-              <a:t>3/25/17</a:t>
+              <a:t>4/2/17</a:t>
             </a:fld>
             <a:endParaRPr lang="en-US"/>
           </a:p>
@@ -3593,15 +3593,7 @@
           <a:p>
             <a:r>
               <a:rPr lang="en-US" dirty="0" smtClean="0"/>
-              <a:t>Lab 1: Printed </a:t>
-            </a:r>
-            <a:r>
-              <a:rPr lang="en-US" dirty="0" smtClean="0"/>
-              <a:t>Circuit </a:t>
-            </a:r>
-            <a:r>
-              <a:rPr lang="en-US" dirty="0" smtClean="0"/>
-              <a:t>Boards: Layers, Layers, Layers</a:t>
+              <a:t>Lab 1: Printed Circuit Boards: Layers, Layers, Layers</a:t>
             </a:r>
             <a:endParaRPr lang="en-US" dirty="0"/>
           </a:p>
@@ -4153,7 +4145,15 @@
             <a:pPr lvl="1"/>
             <a:r>
               <a:rPr lang="en-US" dirty="0" smtClean="0"/>
-              <a:t>This one is very good and really thorough, but it’s too long to watch in class.</a:t>
+              <a:t>This one is very good and </a:t>
+            </a:r>
+            <a:r>
+              <a:rPr lang="en-US" dirty="0" smtClean="0"/>
+              <a:t>really </a:t>
+            </a:r>
+            <a:r>
+              <a:rPr lang="en-US" dirty="0" smtClean="0"/>
+              <a:t>thorough, but it’s too long to watch in class.</a:t>
             </a:r>
           </a:p>
           <a:p>
@@ -4540,7 +4540,7 @@
             <p:ph idx="1"/>
             <p:extLst>
               <p:ext uri="{D42A27DB-BD31-4B8C-83A1-F6EECF244321}">
-                <p14:modId xmlns:p14="http://schemas.microsoft.com/office/powerpoint/2010/main" val="325245849"/>
+                <p14:modId xmlns:p14="http://schemas.microsoft.com/office/powerpoint/2010/main" val="2440241572"/>
               </p:ext>
             </p:extLst>
           </p:nvPr>
@@ -6323,7 +6323,7 @@
                     <a:p>
                       <a:pPr algn="l" fontAlgn="b"/>
                       <a:r>
-                        <a:rPr lang="en-US" sz="1200" b="0" i="0" u="none" strike="noStrike">
+                        <a:rPr lang="en-US" sz="1200" b="0" i="0" u="none" strike="noStrike" dirty="0">
                           <a:solidFill>
                             <a:srgbClr val="000000"/>
                           </a:solidFill>
@@ -6348,7 +6348,10 @@
                       <a:noFill/>
                     </a:lnB>
                     <a:solidFill>
-                      <a:srgbClr val="CCC0DA"/>
+                      <a:schemeClr val="accent3">
+                        <a:lumMod val="20000"/>
+                        <a:lumOff val="80000"/>
+                      </a:schemeClr>
                     </a:solidFill>
                   </a:tcPr>
                 </a:tc>
@@ -6359,7 +6362,7 @@
                     <a:p>
                       <a:pPr algn="l" fontAlgn="b"/>
                       <a:r>
-                        <a:rPr lang="en-US" sz="1200" b="0" i="0" u="none" strike="noStrike">
+                        <a:rPr lang="en-US" sz="1200" b="0" i="0" u="none" strike="noStrike" dirty="0" err="1">
                           <a:solidFill>
                             <a:srgbClr val="000000"/>
                           </a:solidFill>
@@ -6368,6 +6371,13 @@
                         </a:rPr>
                         <a:t>tFinish</a:t>
                       </a:r>
+                      <a:endParaRPr lang="en-US" sz="1200" b="0" i="0" u="none" strike="noStrike" dirty="0">
+                        <a:solidFill>
+                          <a:srgbClr val="000000"/>
+                        </a:solidFill>
+                        <a:effectLst/>
+                        <a:latin typeface="Calibri"/>
+                      </a:endParaRPr>
                     </a:p>
                   </a:txBody>
                   <a:tcPr marL="8030" marR="8030" marT="8030" marB="0" anchor="b">
@@ -6384,7 +6394,10 @@
                       <a:noFill/>
                     </a:lnB>
                     <a:solidFill>
-                      <a:srgbClr val="CCC0DA"/>
+                      <a:schemeClr val="accent3">
+                        <a:lumMod val="20000"/>
+                        <a:lumOff val="80000"/>
+                      </a:schemeClr>
                     </a:solidFill>
                   </a:tcPr>
                 </a:tc>
@@ -6420,7 +6433,10 @@
                       <a:noFill/>
                     </a:lnB>
                     <a:solidFill>
-                      <a:srgbClr val="CCC0DA"/>
+                      <a:schemeClr val="accent3">
+                        <a:lumMod val="20000"/>
+                        <a:lumOff val="80000"/>
+                      </a:schemeClr>
                     </a:solidFill>
                   </a:tcPr>
                 </a:tc>
@@ -6620,7 +6636,10 @@
                       <a:noFill/>
                     </a:lnB>
                     <a:solidFill>
-                      <a:srgbClr val="CCC0DA"/>
+                      <a:schemeClr val="accent3">
+                        <a:lumMod val="20000"/>
+                        <a:lumOff val="80000"/>
+                      </a:schemeClr>
                     </a:solidFill>
                   </a:tcPr>
                 </a:tc>
@@ -6656,7 +6675,10 @@
                       <a:noFill/>
                     </a:lnB>
                     <a:solidFill>
-                      <a:srgbClr val="CCC0DA"/>
+                      <a:schemeClr val="accent3">
+                        <a:lumMod val="20000"/>
+                        <a:lumOff val="80000"/>
+                      </a:schemeClr>
                     </a:solidFill>
                   </a:tcPr>
                 </a:tc>
@@ -6667,7 +6689,7 @@
                     <a:p>
                       <a:pPr algn="l" fontAlgn="b"/>
                       <a:r>
-                        <a:rPr lang="en-US" sz="1200" b="0" i="0" u="none" strike="noStrike">
+                        <a:rPr lang="en-US" sz="1200" b="0" i="0" u="none" strike="noStrike" dirty="0">
                           <a:solidFill>
                             <a:srgbClr val="000000"/>
                           </a:solidFill>
@@ -6692,7 +6714,10 @@
                       <a:noFill/>
                     </a:lnB>
                     <a:solidFill>
-                      <a:srgbClr val="CCC0DA"/>
+                      <a:schemeClr val="accent3">
+                        <a:lumMod val="20000"/>
+                        <a:lumOff val="80000"/>
+                      </a:schemeClr>
                     </a:solidFill>
                   </a:tcPr>
                 </a:tc>
@@ -6892,7 +6917,10 @@
                       <a:noFill/>
                     </a:lnB>
                     <a:solidFill>
-                      <a:srgbClr val="CCC0DA"/>
+                      <a:schemeClr val="accent3">
+                        <a:lumMod val="20000"/>
+                        <a:lumOff val="80000"/>
+                      </a:schemeClr>
                     </a:solidFill>
                   </a:tcPr>
                 </a:tc>
@@ -6928,7 +6956,10 @@
                       <a:noFill/>
                     </a:lnB>
                     <a:solidFill>
-                      <a:srgbClr val="CCC0DA"/>
+                      <a:schemeClr val="accent3">
+                        <a:lumMod val="20000"/>
+                        <a:lumOff val="80000"/>
+                      </a:schemeClr>
                     </a:solidFill>
                   </a:tcPr>
                 </a:tc>
@@ -6939,7 +6970,7 @@
                     <a:p>
                       <a:pPr algn="l" fontAlgn="b"/>
                       <a:r>
-                        <a:rPr lang="en-US" sz="1200" b="0" i="0" u="none" strike="noStrike">
+                        <a:rPr lang="en-US" sz="1200" b="0" i="0" u="none" strike="noStrike" dirty="0">
                           <a:solidFill>
                             <a:srgbClr val="000000"/>
                           </a:solidFill>
@@ -6964,7 +6995,10 @@
                       <a:noFill/>
                     </a:lnB>
                     <a:solidFill>
-                      <a:srgbClr val="CCC0DA"/>
+                      <a:schemeClr val="accent3">
+                        <a:lumMod val="20000"/>
+                        <a:lumOff val="80000"/>
+                      </a:schemeClr>
                     </a:solidFill>
                   </a:tcPr>
                 </a:tc>
@@ -7164,7 +7198,10 @@
                       <a:noFill/>
                     </a:lnB>
                     <a:solidFill>
-                      <a:srgbClr val="CCC0DA"/>
+                      <a:schemeClr val="accent3">
+                        <a:lumMod val="20000"/>
+                        <a:lumOff val="80000"/>
+                      </a:schemeClr>
                     </a:solidFill>
                   </a:tcPr>
                 </a:tc>
@@ -7200,7 +7237,10 @@
                       <a:noFill/>
                     </a:lnB>
                     <a:solidFill>
-                      <a:srgbClr val="CCC0DA"/>
+                      <a:schemeClr val="accent3">
+                        <a:lumMod val="20000"/>
+                        <a:lumOff val="80000"/>
+                      </a:schemeClr>
                     </a:solidFill>
                   </a:tcPr>
                 </a:tc>
@@ -7211,7 +7251,7 @@
                     <a:p>
                       <a:pPr algn="l" fontAlgn="b"/>
                       <a:r>
-                        <a:rPr lang="en-US" sz="1200" b="0" i="0" u="none" strike="noStrike">
+                        <a:rPr lang="en-US" sz="1200" b="0" i="0" u="none" strike="noStrike" dirty="0">
                           <a:solidFill>
                             <a:srgbClr val="000000"/>
                           </a:solidFill>
@@ -7236,7 +7276,10 @@
                       <a:noFill/>
                     </a:lnB>
                     <a:solidFill>
-                      <a:srgbClr val="CCC0DA"/>
+                      <a:schemeClr val="accent3">
+                        <a:lumMod val="20000"/>
+                        <a:lumOff val="80000"/>
+                      </a:schemeClr>
                     </a:solidFill>
                   </a:tcPr>
                 </a:tc>
@@ -7345,7 +7388,7 @@
                     <a:p>
                       <a:pPr algn="l" fontAlgn="b"/>
                       <a:r>
-                        <a:rPr lang="en-US" sz="1200" b="0" i="0" u="none" strike="noStrike">
+                        <a:rPr lang="en-US" sz="1200" b="0" i="0" u="none" strike="noStrike" dirty="0">
                           <a:solidFill>
                             <a:srgbClr val="000000"/>
                           </a:solidFill>
@@ -7436,7 +7479,10 @@
                       <a:noFill/>
                     </a:lnB>
                     <a:solidFill>
-                      <a:srgbClr val="CCC0DA"/>
+                      <a:schemeClr val="accent3">
+                        <a:lumMod val="20000"/>
+                        <a:lumOff val="80000"/>
+                      </a:schemeClr>
                     </a:solidFill>
                   </a:tcPr>
                 </a:tc>
@@ -7472,7 +7518,10 @@
                       <a:noFill/>
                     </a:lnB>
                     <a:solidFill>
-                      <a:srgbClr val="CCC0DA"/>
+                      <a:schemeClr val="accent3">
+                        <a:lumMod val="20000"/>
+                        <a:lumOff val="80000"/>
+                      </a:schemeClr>
                     </a:solidFill>
                   </a:tcPr>
                 </a:tc>
@@ -7483,7 +7532,7 @@
                     <a:p>
                       <a:pPr algn="l" fontAlgn="b"/>
                       <a:r>
-                        <a:rPr lang="en-US" sz="1200" b="0" i="0" u="none" strike="noStrike">
+                        <a:rPr lang="en-US" sz="1200" b="0" i="0" u="none" strike="noStrike" dirty="0">
                           <a:solidFill>
                             <a:srgbClr val="000000"/>
                           </a:solidFill>
@@ -7508,7 +7557,10 @@
                       <a:noFill/>
                     </a:lnB>
                     <a:solidFill>
-                      <a:srgbClr val="CCC0DA"/>
+                      <a:schemeClr val="accent3">
+                        <a:lumMod val="20000"/>
+                        <a:lumOff val="80000"/>
+                      </a:schemeClr>
                     </a:solidFill>
                   </a:tcPr>
                 </a:tc>
@@ -7708,7 +7760,10 @@
                       <a:noFill/>
                     </a:lnB>
                     <a:solidFill>
-                      <a:srgbClr val="CCC0DA"/>
+                      <a:schemeClr val="accent3">
+                        <a:lumMod val="20000"/>
+                        <a:lumOff val="80000"/>
+                      </a:schemeClr>
                     </a:solidFill>
                   </a:tcPr>
                 </a:tc>
@@ -7744,7 +7799,10 @@
                       <a:noFill/>
                     </a:lnB>
                     <a:solidFill>
-                      <a:srgbClr val="CCC0DA"/>
+                      <a:schemeClr val="accent3">
+                        <a:lumMod val="20000"/>
+                        <a:lumOff val="80000"/>
+                      </a:schemeClr>
                     </a:solidFill>
                   </a:tcPr>
                 </a:tc>
@@ -7755,7 +7813,7 @@
                     <a:p>
                       <a:pPr algn="l" fontAlgn="b"/>
                       <a:r>
-                        <a:rPr lang="en-US" sz="1200" b="0" i="0" u="none" strike="noStrike">
+                        <a:rPr lang="en-US" sz="1200" b="0" i="0" u="none" strike="noStrike" dirty="0">
                           <a:solidFill>
                             <a:srgbClr val="000000"/>
                           </a:solidFill>
@@ -7780,7 +7838,10 @@
                       <a:noFill/>
                     </a:lnB>
                     <a:solidFill>
-                      <a:srgbClr val="CCC0DA"/>
+                      <a:schemeClr val="accent3">
+                        <a:lumMod val="20000"/>
+                        <a:lumOff val="80000"/>
+                      </a:schemeClr>
                     </a:solidFill>
                   </a:tcPr>
                 </a:tc>
@@ -7820,7 +7881,7 @@
                     <a:lstStyle/>
                     <a:p>
                       <a:pPr algn="l" fontAlgn="b"/>
-                      <a:endParaRPr lang="en-US" sz="1200" b="0" i="0" u="none" strike="noStrike">
+                      <a:endParaRPr lang="en-US" sz="1200" b="0" i="0" u="none" strike="noStrike" dirty="0">
                         <a:solidFill>
                           <a:srgbClr val="000000"/>
                         </a:solidFill>
@@ -11829,6 +11890,37 @@
           <a:bodyPr/>
           <a:lstStyle/>
           <a:p>
+            <a:r>
+              <a:rPr lang="en-US" dirty="0" smtClean="0"/>
+              <a:t>The “Red board”</a:t>
+            </a:r>
+            <a:endParaRPr lang="en-US" dirty="0"/>
+          </a:p>
+          <a:p>
+            <a:r>
+              <a:rPr lang="en-US" dirty="0"/>
+              <a:t>open /Users/</a:t>
+            </a:r>
+            <a:r>
+              <a:rPr lang="en-US" dirty="0" err="1"/>
+              <a:t>swanson</a:t>
+            </a:r>
+            <a:r>
+              <a:rPr lang="en-US" dirty="0"/>
+              <a:t>/UCSD/Teaching/17sp-190/</a:t>
+            </a:r>
+            <a:r>
+              <a:rPr lang="en-US" dirty="0" err="1"/>
+              <a:t>QuadClass</a:t>
+            </a:r>
+            <a:r>
+              <a:rPr lang="en-US" dirty="0"/>
+              <a:t>-Resources/Lecture\ Slides/Examples/ATmega128RFA1-DevBoard/ATmega128RFA1-</a:t>
+            </a:r>
+            <a:r>
+              <a:rPr lang="en-US" dirty="0" smtClean="0"/>
+              <a:t>DevBoard.brd</a:t>
+            </a:r>
             <a:endParaRPr lang="en-US" dirty="0"/>
           </a:p>
         </p:txBody>
@@ -12280,8 +12372,17 @@
           <a:p>
             <a:r>
               <a:rPr lang="en-US" dirty="0" smtClean="0"/>
-              <a:t>Two connections </a:t>
-            </a:r>
+              <a:t>Two </a:t>
+            </a:r>
+            <a:r>
+              <a:rPr lang="en-US" dirty="0" smtClean="0"/>
+              <a:t>‘pins’</a:t>
+            </a:r>
+            <a:r>
+              <a:rPr lang="en-US" dirty="0" smtClean="0"/>
+              <a:t> </a:t>
+            </a:r>
+            <a:endParaRPr lang="en-US" dirty="0" smtClean="0"/>
           </a:p>
           <a:p>
             <a:pPr lvl="1"/>
@@ -12450,7 +12551,15 @@
           <a:p>
             <a:r>
               <a:rPr lang="en-US" dirty="0" smtClean="0"/>
-              <a:t>Two pads (through holes)</a:t>
+              <a:t>Two </a:t>
+            </a:r>
+            <a:r>
+              <a:rPr lang="en-US" dirty="0" smtClean="0"/>
+              <a:t>“pads” </a:t>
+            </a:r>
+            <a:r>
+              <a:rPr lang="en-US" dirty="0" smtClean="0"/>
+              <a:t>(through holes)</a:t>
             </a:r>
           </a:p>
           <a:p>
@@ -12811,28 +12920,45 @@
           <a:p>
             <a:r>
               <a:rPr lang="en-US" dirty="0" smtClean="0"/>
-              <a:t>Packages have layers too, but not all of them</a:t>
+              <a:t>Packages have </a:t>
+            </a:r>
+            <a:r>
+              <a:rPr lang="en-US" dirty="0" smtClean="0"/>
+              <a:t>the same layers as boards.</a:t>
             </a:r>
             <a:endParaRPr lang="en-US" dirty="0"/>
           </a:p>
           <a:p>
-            <a:pPr lvl="1"/>
-            <a:r>
-              <a:rPr lang="en-US" dirty="0" smtClean="0"/>
-              <a:t>E.g. no inner metal layers</a:t>
-            </a:r>
-          </a:p>
-          <a:p>
-            <a:r>
-              <a:rPr lang="en-US" dirty="0" smtClean="0"/>
-              <a:t>For packages “t” means device side, “b” means opposite side.</a:t>
+            <a:r>
+              <a:rPr lang="en-US" dirty="0" smtClean="0"/>
+              <a:t>For </a:t>
+            </a:r>
+            <a:r>
+              <a:rPr lang="en-US" dirty="0" smtClean="0"/>
+              <a:t>packages “t” means device side, “b” means opposite side.</a:t>
             </a:r>
             <a:endParaRPr lang="en-US" dirty="0"/>
           </a:p>
           <a:p>
             <a:r>
               <a:rPr lang="en-US" dirty="0" smtClean="0"/>
-              <a:t>If you put the devices on the back side of the board, “t” and “b” will swap.</a:t>
+              <a:t>If you put the devices on the back side of the </a:t>
+            </a:r>
+            <a:r>
+              <a:rPr lang="en-US" dirty="0" smtClean="0"/>
+              <a:t>board (i.e</a:t>
+            </a:r>
+            <a:r>
+              <a:rPr lang="en-US" dirty="0" smtClean="0"/>
+              <a:t>., “mirror” them)</a:t>
+            </a:r>
+            <a:r>
+              <a:rPr lang="en-US" dirty="0" smtClean="0"/>
+              <a:t>, </a:t>
+            </a:r>
+            <a:r>
+              <a:rPr lang="en-US" dirty="0" smtClean="0"/>
+              <a:t>“t” and “b” will swap.</a:t>
             </a:r>
             <a:endParaRPr lang="en-US" dirty="0"/>
           </a:p>
@@ -13041,13 +13167,11 @@
           <a:p>
             <a:r>
               <a:rPr lang="en-US" dirty="0" smtClean="0"/>
-              <a:t>Make it pretty – you want a nice looking board </a:t>
-            </a:r>
-            <a:r>
-              <a:rPr lang="en-US" dirty="0" smtClean="0">
-                <a:sym typeface="Wingdings"/>
-              </a:rPr>
-              <a:t></a:t>
+              <a:t>Make it pretty – you want a nice looking </a:t>
+            </a:r>
+            <a:r>
+              <a:rPr lang="en-US" dirty="0" smtClean="0"/>
+              <a:t>board</a:t>
             </a:r>
             <a:endParaRPr lang="en-US" dirty="0">
               <a:sym typeface="Wingdings"/>
@@ -13258,6 +13382,30 @@
           <a:bodyPr/>
           <a:lstStyle/>
           <a:p>
+            <a:r>
+              <a:rPr lang="en-US" dirty="0"/>
+              <a:t>open /Users/</a:t>
+            </a:r>
+            <a:r>
+              <a:rPr lang="en-US" dirty="0" err="1"/>
+              <a:t>swanson</a:t>
+            </a:r>
+            <a:r>
+              <a:rPr lang="en-US" dirty="0"/>
+              <a:t>/UCSD/Teaching/17sp-190/</a:t>
+            </a:r>
+            <a:r>
+              <a:rPr lang="en-US" dirty="0" err="1"/>
+              <a:t>QuadClass</a:t>
+            </a:r>
+            <a:r>
+              <a:rPr lang="en-US" dirty="0"/>
+              <a:t>-Resources/Lecture\ Slides/Examples/</a:t>
+            </a:r>
+            <a:r>
+              <a:rPr lang="en-US"/>
+              <a:t>Myduino.sch</a:t>
+            </a:r>
             <a:endParaRPr lang="en-US"/>
           </a:p>
         </p:txBody>

</xml_diff>

<commit_message>
new slides, new todos, update lib.  A bunch of new lab write ups
</commit_message>
<xml_diff>
--- a/Lecture Slides/Lab01-Eagle-Intro.pptx
+++ b/Lecture Slides/Lab01-Eagle-Intro.pptx
@@ -5,7 +5,7 @@
     <p:sldMasterId id="2147483648" r:id="rId1"/>
   </p:sldMasterIdLst>
   <p:notesMasterIdLst>
-    <p:notesMasterId r:id="rId55"/>
+    <p:notesMasterId r:id="rId31"/>
   </p:notesMasterIdLst>
   <p:sldIdLst>
     <p:sldId id="292" r:id="rId2"/>
@@ -33,34 +33,10 @@
     <p:sldId id="286" r:id="rId24"/>
     <p:sldId id="287" r:id="rId25"/>
     <p:sldId id="259" r:id="rId26"/>
-    <p:sldId id="269" r:id="rId27"/>
-    <p:sldId id="308" r:id="rId28"/>
-    <p:sldId id="309" r:id="rId29"/>
-    <p:sldId id="310" r:id="rId30"/>
-    <p:sldId id="306" r:id="rId31"/>
-    <p:sldId id="270" r:id="rId32"/>
-    <p:sldId id="271" r:id="rId33"/>
-    <p:sldId id="272" r:id="rId34"/>
-    <p:sldId id="273" r:id="rId35"/>
-    <p:sldId id="274" r:id="rId36"/>
-    <p:sldId id="275" r:id="rId37"/>
-    <p:sldId id="277" r:id="rId38"/>
-    <p:sldId id="276" r:id="rId39"/>
-    <p:sldId id="281" r:id="rId40"/>
-    <p:sldId id="289" r:id="rId41"/>
-    <p:sldId id="290" r:id="rId42"/>
-    <p:sldId id="261" r:id="rId43"/>
-    <p:sldId id="262" r:id="rId44"/>
-    <p:sldId id="268" r:id="rId45"/>
-    <p:sldId id="263" r:id="rId46"/>
-    <p:sldId id="264" r:id="rId47"/>
-    <p:sldId id="265" r:id="rId48"/>
-    <p:sldId id="266" r:id="rId49"/>
-    <p:sldId id="267" r:id="rId50"/>
-    <p:sldId id="305" r:id="rId51"/>
-    <p:sldId id="311" r:id="rId52"/>
-    <p:sldId id="313" r:id="rId53"/>
-    <p:sldId id="312" r:id="rId54"/>
+    <p:sldId id="305" r:id="rId27"/>
+    <p:sldId id="311" r:id="rId28"/>
+    <p:sldId id="313" r:id="rId29"/>
+    <p:sldId id="312" r:id="rId30"/>
   </p:sldIdLst>
   <p:sldSz cx="9144000" cy="6858000" type="screen4x3"/>
   <p:notesSz cx="6858000" cy="9144000"/>
@@ -260,7 +236,7 @@
           <a:p>
             <a:fld id="{BC745CAF-6697-EB43-8D33-148B2A11868D}" type="datetimeFigureOut">
               <a:rPr lang="en-US" smtClean="0"/>
-              <a:t>4/5/18</a:t>
+              <a:t>1/22/19</a:t>
             </a:fld>
             <a:endParaRPr lang="en-US"/>
           </a:p>
@@ -793,7 +769,7 @@
           <a:p>
             <a:fld id="{0675A308-8787-9B42-956E-CA40C2F0F6AE}" type="datetimeFigureOut">
               <a:rPr lang="en-US" smtClean="0"/>
-              <a:t>4/5/18</a:t>
+              <a:t>1/22/19</a:t>
             </a:fld>
             <a:endParaRPr lang="en-US"/>
           </a:p>
@@ -963,7 +939,7 @@
           <a:p>
             <a:fld id="{0675A308-8787-9B42-956E-CA40C2F0F6AE}" type="datetimeFigureOut">
               <a:rPr lang="en-US" smtClean="0"/>
-              <a:t>4/5/18</a:t>
+              <a:t>1/22/19</a:t>
             </a:fld>
             <a:endParaRPr lang="en-US"/>
           </a:p>
@@ -1143,7 +1119,7 @@
           <a:p>
             <a:fld id="{0675A308-8787-9B42-956E-CA40C2F0F6AE}" type="datetimeFigureOut">
               <a:rPr lang="en-US" smtClean="0"/>
-              <a:t>4/5/18</a:t>
+              <a:t>1/22/19</a:t>
             </a:fld>
             <a:endParaRPr lang="en-US"/>
           </a:p>
@@ -1313,7 +1289,7 @@
           <a:p>
             <a:fld id="{0675A308-8787-9B42-956E-CA40C2F0F6AE}" type="datetimeFigureOut">
               <a:rPr lang="en-US" smtClean="0"/>
-              <a:t>4/5/18</a:t>
+              <a:t>1/22/19</a:t>
             </a:fld>
             <a:endParaRPr lang="en-US"/>
           </a:p>
@@ -1559,7 +1535,7 @@
           <a:p>
             <a:fld id="{0675A308-8787-9B42-956E-CA40C2F0F6AE}" type="datetimeFigureOut">
               <a:rPr lang="en-US" smtClean="0"/>
-              <a:t>4/5/18</a:t>
+              <a:t>1/22/19</a:t>
             </a:fld>
             <a:endParaRPr lang="en-US"/>
           </a:p>
@@ -1847,7 +1823,7 @@
           <a:p>
             <a:fld id="{0675A308-8787-9B42-956E-CA40C2F0F6AE}" type="datetimeFigureOut">
               <a:rPr lang="en-US" smtClean="0"/>
-              <a:t>4/5/18</a:t>
+              <a:t>1/22/19</a:t>
             </a:fld>
             <a:endParaRPr lang="en-US"/>
           </a:p>
@@ -2269,7 +2245,7 @@
           <a:p>
             <a:fld id="{0675A308-8787-9B42-956E-CA40C2F0F6AE}" type="datetimeFigureOut">
               <a:rPr lang="en-US" smtClean="0"/>
-              <a:t>4/5/18</a:t>
+              <a:t>1/22/19</a:t>
             </a:fld>
             <a:endParaRPr lang="en-US"/>
           </a:p>
@@ -2387,7 +2363,7 @@
           <a:p>
             <a:fld id="{0675A308-8787-9B42-956E-CA40C2F0F6AE}" type="datetimeFigureOut">
               <a:rPr lang="en-US" smtClean="0"/>
-              <a:t>4/5/18</a:t>
+              <a:t>1/22/19</a:t>
             </a:fld>
             <a:endParaRPr lang="en-US"/>
           </a:p>
@@ -2482,7 +2458,7 @@
           <a:p>
             <a:fld id="{0675A308-8787-9B42-956E-CA40C2F0F6AE}" type="datetimeFigureOut">
               <a:rPr lang="en-US" smtClean="0"/>
-              <a:t>4/5/18</a:t>
+              <a:t>1/22/19</a:t>
             </a:fld>
             <a:endParaRPr lang="en-US"/>
           </a:p>
@@ -2759,7 +2735,7 @@
           <a:p>
             <a:fld id="{0675A308-8787-9B42-956E-CA40C2F0F6AE}" type="datetimeFigureOut">
               <a:rPr lang="en-US" smtClean="0"/>
-              <a:t>4/5/18</a:t>
+              <a:t>1/22/19</a:t>
             </a:fld>
             <a:endParaRPr lang="en-US"/>
           </a:p>
@@ -3012,7 +2988,7 @@
           <a:p>
             <a:fld id="{0675A308-8787-9B42-956E-CA40C2F0F6AE}" type="datetimeFigureOut">
               <a:rPr lang="en-US" smtClean="0"/>
-              <a:t>4/5/18</a:t>
+              <a:t>1/22/19</a:t>
             </a:fld>
             <a:endParaRPr lang="en-US"/>
           </a:p>
@@ -3225,7 +3201,7 @@
           <a:p>
             <a:fld id="{0675A308-8787-9B42-956E-CA40C2F0F6AE}" type="datetimeFigureOut">
               <a:rPr lang="en-US" smtClean="0"/>
-              <a:t>4/5/18</a:t>
+              <a:t>1/22/19</a:t>
             </a:fld>
             <a:endParaRPr lang="en-US"/>
           </a:p>
@@ -13140,7 +13116,7 @@
             <a:spLocks noGrp="1"/>
           </p:cNvSpPr>
           <p:nvPr>
-            <p:ph type="ctrTitle"/>
+            <p:ph type="title"/>
           </p:nvPr>
         </p:nvSpPr>
         <p:spPr/>
@@ -13150,19 +13126,19 @@
           <a:p>
             <a:r>
               <a:rPr lang="en-US" dirty="0"/>
-              <a:t>Schematic Capture	</a:t>
+              <a:t>The Lab</a:t>
             </a:r>
           </a:p>
         </p:txBody>
       </p:sp>
       <p:sp>
         <p:nvSpPr>
-          <p:cNvPr id="3" name="Subtitle 2"/>
+          <p:cNvPr id="3" name="Content Placeholder 2"/>
           <p:cNvSpPr>
             <a:spLocks noGrp="1"/>
           </p:cNvSpPr>
           <p:nvPr>
-            <p:ph type="subTitle" idx="1"/>
+            <p:ph idx="1"/>
           </p:nvPr>
         </p:nvSpPr>
         <p:spPr/>
@@ -13170,6 +13146,27 @@
           <a:bodyPr/>
           <a:lstStyle/>
           <a:p>
+            <a:r>
+              <a:rPr lang="en-US" dirty="0"/>
+              <a:t>Use Eagle to design a simple schematic and board.</a:t>
+            </a:r>
+          </a:p>
+          <a:p>
+            <a:r>
+              <a:rPr lang="en-US" dirty="0"/>
+              <a:t>Run it through the tool flow.</a:t>
+            </a:r>
+          </a:p>
+          <a:p>
+            <a:r>
+              <a:rPr lang="en-US" dirty="0">
+                <a:hlinkClick r:id="rId2"/>
+              </a:rPr>
+              <a:t>https://sites.google.com/a/eng.ucsd.edu/quadcopterclass/labs/lab-2-using-eagle</a:t>
+            </a:r>
+            <a:endParaRPr lang="en-US" dirty="0"/>
+          </a:p>
+          <a:p>
             <a:endParaRPr lang="en-US" dirty="0"/>
           </a:p>
         </p:txBody>
@@ -13177,7 +13174,7 @@
     </p:spTree>
     <p:extLst>
       <p:ext uri="{BB962C8B-B14F-4D97-AF65-F5344CB8AC3E}">
-        <p14:creationId xmlns:p14="http://schemas.microsoft.com/office/powerpoint/2010/main" val="1812849256"/>
+        <p14:creationId xmlns:p14="http://schemas.microsoft.com/office/powerpoint/2010/main" val="2599178135"/>
       </p:ext>
     </p:extLst>
   </p:cSld>
@@ -13206,7 +13203,13 @@
       </p:grpSpPr>
       <p:sp>
         <p:nvSpPr>
-          <p:cNvPr id="2" name="Title 1"/>
+          <p:cNvPr id="2" name="Title 1">
+            <a:extLst>
+              <a:ext uri="{FF2B5EF4-FFF2-40B4-BE49-F238E27FC236}">
+                <a16:creationId xmlns:a16="http://schemas.microsoft.com/office/drawing/2014/main" id="{B37E69C4-6D54-194A-85C7-586A0D9A7293}"/>
+              </a:ext>
+            </a:extLst>
+          </p:cNvPr>
           <p:cNvSpPr>
             <a:spLocks noGrp="1"/>
           </p:cNvSpPr>
@@ -13221,14 +13224,20 @@
           <a:p>
             <a:r>
               <a:rPr lang="en-US" dirty="0"/>
-              <a:t>Schematics Goals</a:t>
+              <a:t>Eagle Lint</a:t>
             </a:r>
           </a:p>
         </p:txBody>
       </p:sp>
       <p:sp>
         <p:nvSpPr>
-          <p:cNvPr id="3" name="Content Placeholder 2"/>
+          <p:cNvPr id="3" name="Content Placeholder 2">
+            <a:extLst>
+              <a:ext uri="{FF2B5EF4-FFF2-40B4-BE49-F238E27FC236}">
+                <a16:creationId xmlns:a16="http://schemas.microsoft.com/office/drawing/2014/main" id="{BD1A45B9-43FC-BB46-BC02-8DE1D835F9BE}"/>
+              </a:ext>
+            </a:extLst>
+          </p:cNvPr>
           <p:cNvSpPr>
             <a:spLocks noGrp="1"/>
           </p:cNvSpPr>
@@ -13238,24 +13247,109 @@
         </p:nvSpPr>
         <p:spPr/>
         <p:txBody>
-          <a:bodyPr/>
+          <a:bodyPr>
+            <a:normAutofit fontScale="62500" lnSpcReduction="20000"/>
+          </a:bodyPr>
           <a:lstStyle/>
           <a:p>
             <a:r>
               <a:rPr lang="en-US" dirty="0"/>
-              <a:t>Determine what components your PCB will hold</a:t>
-            </a:r>
-          </a:p>
-          <a:p>
-            <a:r>
-              <a:rPr lang="en-US" dirty="0"/>
-              <a:t>Define the electrical connectivity between those components</a:t>
-            </a:r>
-          </a:p>
-          <a:p>
-            <a:r>
-              <a:rPr lang="en-US" dirty="0"/>
-              <a:t>Specify some metadata about the parts</a:t>
+              <a:t>lint:  </a:t>
+            </a:r>
+          </a:p>
+          <a:p>
+            <a:pPr lvl="1"/>
+            <a:r>
+              <a:rPr lang="en-US" i="1" dirty="0"/>
+              <a:t>Tool to check coding standards and other invariants about a computer system.</a:t>
+            </a:r>
+          </a:p>
+          <a:p>
+            <a:r>
+              <a:rPr lang="en-US" dirty="0" err="1"/>
+              <a:t>Eaglint</a:t>
+            </a:r>
+            <a:r>
+              <a:rPr lang="en-US" dirty="0"/>
+              <a:t> will check your libraries, schematics</a:t>
+            </a:r>
+          </a:p>
+          <a:p>
+            <a:pPr lvl="1"/>
+            <a:r>
+              <a:rPr lang="en-US" dirty="0"/>
+              <a:t>Check for common problems</a:t>
+            </a:r>
+          </a:p>
+          <a:p>
+            <a:pPr lvl="1"/>
+            <a:r>
+              <a:rPr lang="en-US" dirty="0"/>
+              <a:t>Check for correctness</a:t>
+            </a:r>
+          </a:p>
+          <a:p>
+            <a:pPr lvl="1"/>
+            <a:r>
+              <a:rPr lang="en-US" dirty="0"/>
+              <a:t>Check for style</a:t>
+            </a:r>
+          </a:p>
+          <a:p>
+            <a:r>
+              <a:rPr lang="en-US" dirty="0"/>
+              <a:t>Also checks for other files in your repo</a:t>
+            </a:r>
+          </a:p>
+          <a:p>
+            <a:pPr lvl="1"/>
+            <a:r>
+              <a:rPr lang="en-US" dirty="0" err="1"/>
+              <a:t>Eaglint</a:t>
+            </a:r>
+            <a:r>
+              <a:rPr lang="en-US" dirty="0"/>
+              <a:t> will tell you what it’s looking for.</a:t>
+            </a:r>
+          </a:p>
+          <a:p>
+            <a:pPr lvl="1"/>
+            <a:r>
+              <a:rPr lang="en-US" dirty="0"/>
+              <a:t>Pay attention.</a:t>
+            </a:r>
+          </a:p>
+          <a:p>
+            <a:r>
+              <a:rPr lang="en-US" dirty="0"/>
+              <a:t>Provides a workflow for me to review your designs and provide feedback.</a:t>
+            </a:r>
+          </a:p>
+          <a:p>
+            <a:r>
+              <a:rPr lang="en-US" dirty="0"/>
+              <a:t>To use</a:t>
+            </a:r>
+          </a:p>
+          <a:p>
+            <a:pPr lvl="1"/>
+            <a:r>
+              <a:rPr lang="en-US" dirty="0"/>
+              <a:t>Visit </a:t>
+            </a:r>
+            <a:r>
+              <a:rPr lang="en-US" dirty="0">
+                <a:hlinkClick r:id="rId2"/>
+              </a:rPr>
+              <a:t>http://eaglint.nvsl.io</a:t>
+            </a:r>
+            <a:endParaRPr lang="en-US" dirty="0"/>
+          </a:p>
+          <a:p>
+            <a:pPr lvl="1"/>
+            <a:r>
+              <a:rPr lang="en-US" dirty="0"/>
+              <a:t>You received a welcome email a couple of nights ago.</a:t>
             </a:r>
           </a:p>
           <a:p>
@@ -13266,7 +13360,7 @@
     </p:spTree>
     <p:extLst>
       <p:ext uri="{BB962C8B-B14F-4D97-AF65-F5344CB8AC3E}">
-        <p14:creationId xmlns:p14="http://schemas.microsoft.com/office/powerpoint/2010/main" val="18262680"/>
+        <p14:creationId xmlns:p14="http://schemas.microsoft.com/office/powerpoint/2010/main" val="2361343328"/>
       </p:ext>
     </p:extLst>
   </p:cSld>
@@ -13295,7 +13389,13 @@
       </p:grpSpPr>
       <p:sp>
         <p:nvSpPr>
-          <p:cNvPr id="2" name="Title 1"/>
+          <p:cNvPr id="2" name="Title 1">
+            <a:extLst>
+              <a:ext uri="{FF2B5EF4-FFF2-40B4-BE49-F238E27FC236}">
+                <a16:creationId xmlns:a16="http://schemas.microsoft.com/office/drawing/2014/main" id="{833E81A3-BF51-5545-AE4A-34E442EE3395}"/>
+              </a:ext>
+            </a:extLst>
+          </p:cNvPr>
           <p:cNvSpPr>
             <a:spLocks noGrp="1"/>
           </p:cNvSpPr>
@@ -13310,14 +13410,20 @@
           <a:p>
             <a:r>
               <a:rPr lang="en-US" dirty="0"/>
-              <a:t>Schematic Example</a:t>
+              <a:t>Eagle Lint Process</a:t>
             </a:r>
           </a:p>
         </p:txBody>
       </p:sp>
       <p:sp>
         <p:nvSpPr>
-          <p:cNvPr id="3" name="Content Placeholder 2"/>
+          <p:cNvPr id="3" name="Content Placeholder 2">
+            <a:extLst>
+              <a:ext uri="{FF2B5EF4-FFF2-40B4-BE49-F238E27FC236}">
+                <a16:creationId xmlns:a16="http://schemas.microsoft.com/office/drawing/2014/main" id="{97DDE2E0-2980-844E-B1DB-CACC04B172FE}"/>
+              </a:ext>
+            </a:extLst>
+          </p:cNvPr>
           <p:cNvSpPr>
             <a:spLocks noGrp="1"/>
           </p:cNvSpPr>
@@ -13327,28 +13433,179 @@
         </p:nvSpPr>
         <p:spPr/>
         <p:txBody>
-          <a:bodyPr/>
+          <a:bodyPr>
+            <a:normAutofit fontScale="85000" lnSpcReduction="20000"/>
+          </a:bodyPr>
           <a:lstStyle/>
           <a:p>
-            <a:r>
-              <a:rPr lang="en-US" dirty="0"/>
-              <a:t>open /Users/</a:t>
+            <a:pPr marL="514350" indent="-514350">
+              <a:buFont typeface="+mj-lt"/>
+              <a:buAutoNum type="arabicPeriod"/>
+            </a:pPr>
+            <a:r>
+              <a:rPr lang="en-US" dirty="0"/>
+              <a:t>Commit and push your changes to </a:t>
             </a:r>
             <a:r>
               <a:rPr lang="en-US" dirty="0" err="1"/>
-              <a:t>swanson</a:t>
-            </a:r>
-            <a:r>
-              <a:rPr lang="en-US" dirty="0"/>
-              <a:t>/UCSD/Teaching/18sp-190/</a:t>
+              <a:t>github</a:t>
+            </a:r>
+            <a:endParaRPr lang="en-US" dirty="0"/>
+          </a:p>
+          <a:p>
+            <a:pPr marL="514350" indent="-514350">
+              <a:buFont typeface="+mj-lt"/>
+              <a:buAutoNum type="arabicPeriod"/>
+            </a:pPr>
+            <a:r>
+              <a:rPr lang="en-US" dirty="0"/>
+              <a:t>Submit your repo to </a:t>
             </a:r>
             <a:r>
               <a:rPr lang="en-US" dirty="0" err="1"/>
-              <a:t>QuadClass</a:t>
-            </a:r>
-            <a:r>
-              <a:rPr lang="en-US" dirty="0"/>
-              <a:t>-Resources/Lecture\ Slides/Examples/ATmega128RFA1-DevBoard/ATmega128RFA1-DevBoard.sch</a:t>
+              <a:t>Eaglint</a:t>
+            </a:r>
+            <a:r>
+              <a:rPr lang="en-US" dirty="0"/>
+              <a:t> for a quick check</a:t>
+            </a:r>
+          </a:p>
+          <a:p>
+            <a:pPr marL="514350" indent="-514350">
+              <a:buFont typeface="+mj-lt"/>
+              <a:buAutoNum type="arabicPeriod"/>
+            </a:pPr>
+            <a:r>
+              <a:rPr lang="en-US" dirty="0">
+                <a:solidFill>
+                  <a:srgbClr val="FF0000"/>
+                </a:solidFill>
+              </a:rPr>
+              <a:t>Submit your repo to </a:t>
+            </a:r>
+            <a:r>
+              <a:rPr lang="en-US" dirty="0" err="1">
+                <a:solidFill>
+                  <a:srgbClr val="FF0000"/>
+                </a:solidFill>
+              </a:rPr>
+              <a:t>Eaglint</a:t>
+            </a:r>
+            <a:r>
+              <a:rPr lang="en-US" dirty="0">
+                <a:solidFill>
+                  <a:srgbClr val="FF0000"/>
+                </a:solidFill>
+              </a:rPr>
+              <a:t> for a full check</a:t>
+            </a:r>
+          </a:p>
+          <a:p>
+            <a:pPr marL="514350" indent="-514350">
+              <a:buFont typeface="+mj-lt"/>
+              <a:buAutoNum type="arabicPeriod"/>
+            </a:pPr>
+            <a:r>
+              <a:rPr lang="en-US" dirty="0"/>
+              <a:t>If warnings/errors</a:t>
+            </a:r>
+          </a:p>
+          <a:p>
+            <a:pPr marL="400050" lvl="1" indent="0">
+              <a:buNone/>
+            </a:pPr>
+            <a:r>
+              <a:rPr lang="en-US" dirty="0"/>
+              <a:t>Fix and </a:t>
+            </a:r>
+            <a:r>
+              <a:rPr lang="en-US" dirty="0" err="1"/>
+              <a:t>goto</a:t>
+            </a:r>
+            <a:r>
+              <a:rPr lang="en-US" dirty="0"/>
+              <a:t> 1.</a:t>
+            </a:r>
+          </a:p>
+          <a:p>
+            <a:pPr marL="400050" lvl="1" indent="0">
+              <a:buNone/>
+            </a:pPr>
+            <a:r>
+              <a:rPr lang="en-US" dirty="0"/>
+              <a:t>Or justify them and </a:t>
+            </a:r>
+            <a:r>
+              <a:rPr lang="en-US" dirty="0" err="1"/>
+              <a:t>goto</a:t>
+            </a:r>
+            <a:r>
+              <a:rPr lang="en-US" dirty="0"/>
+              <a:t> 5</a:t>
+            </a:r>
+          </a:p>
+          <a:p>
+            <a:pPr marL="514350" indent="-514350">
+              <a:buFont typeface="+mj-lt"/>
+              <a:buAutoNum type="arabicPeriod"/>
+            </a:pPr>
+            <a:r>
+              <a:rPr lang="en-US" dirty="0">
+                <a:solidFill>
+                  <a:srgbClr val="FF0000"/>
+                </a:solidFill>
+              </a:rPr>
+              <a:t>Submit for human review</a:t>
+            </a:r>
+          </a:p>
+          <a:p>
+            <a:pPr marL="514350" indent="-514350">
+              <a:buFont typeface="+mj-lt"/>
+              <a:buAutoNum type="arabicPeriod"/>
+            </a:pPr>
+            <a:r>
+              <a:rPr lang="en-US" dirty="0"/>
+              <a:t>If rejected</a:t>
+            </a:r>
+          </a:p>
+          <a:p>
+            <a:pPr marL="400050" lvl="1" indent="0">
+              <a:buNone/>
+            </a:pPr>
+            <a:r>
+              <a:rPr lang="en-US" dirty="0"/>
+              <a:t>Read comments; </a:t>
+            </a:r>
+            <a:r>
+              <a:rPr lang="en-US" dirty="0" err="1"/>
+              <a:t>goto</a:t>
+            </a:r>
+            <a:r>
+              <a:rPr lang="en-US" dirty="0"/>
+              <a:t> 1.</a:t>
+            </a:r>
+          </a:p>
+          <a:p>
+            <a:pPr marL="514350" indent="-514350">
+              <a:buFont typeface="+mj-lt"/>
+              <a:buAutoNum type="arabicPeriod"/>
+            </a:pPr>
+            <a:r>
+              <a:rPr lang="en-US" dirty="0"/>
+              <a:t>Else if accepted</a:t>
+            </a:r>
+          </a:p>
+          <a:p>
+            <a:pPr marL="400050" lvl="1" indent="0">
+              <a:buNone/>
+            </a:pPr>
+            <a:r>
+              <a:rPr lang="en-US" dirty="0" err="1"/>
+              <a:t>Goto</a:t>
+            </a:r>
+            <a:r>
+              <a:rPr lang="en-US" dirty="0"/>
+              <a:t> next lab</a:t>
             </a:r>
           </a:p>
         </p:txBody>
@@ -13356,7 +13613,7 @@
     </p:spTree>
     <p:extLst>
       <p:ext uri="{BB962C8B-B14F-4D97-AF65-F5344CB8AC3E}">
-        <p14:creationId xmlns:p14="http://schemas.microsoft.com/office/powerpoint/2010/main" val="651386354"/>
+        <p14:creationId xmlns:p14="http://schemas.microsoft.com/office/powerpoint/2010/main" val="1072275094"/>
       </p:ext>
     </p:extLst>
   </p:cSld>
@@ -13385,7 +13642,13 @@
       </p:grpSpPr>
       <p:sp>
         <p:nvSpPr>
-          <p:cNvPr id="2" name="Title 1"/>
+          <p:cNvPr id="2" name="Title 1">
+            <a:extLst>
+              <a:ext uri="{FF2B5EF4-FFF2-40B4-BE49-F238E27FC236}">
+                <a16:creationId xmlns:a16="http://schemas.microsoft.com/office/drawing/2014/main" id="{F65CE4FC-EF5F-C444-B1EC-1755D0ED84EF}"/>
+              </a:ext>
+            </a:extLst>
+          </p:cNvPr>
           <p:cNvSpPr>
             <a:spLocks noGrp="1"/>
           </p:cNvSpPr>
@@ -13400,14 +13663,20 @@
           <a:p>
             <a:r>
               <a:rPr lang="en-US" dirty="0"/>
-              <a:t>Eagle Pitfalls</a:t>
+              <a:t>Grading on PCB Labs</a:t>
             </a:r>
           </a:p>
         </p:txBody>
       </p:sp>
       <p:sp>
         <p:nvSpPr>
-          <p:cNvPr id="3" name="Content Placeholder 2"/>
+          <p:cNvPr id="3" name="Content Placeholder 2">
+            <a:extLst>
+              <a:ext uri="{FF2B5EF4-FFF2-40B4-BE49-F238E27FC236}">
+                <a16:creationId xmlns:a16="http://schemas.microsoft.com/office/drawing/2014/main" id="{6CAF32E4-A95A-5F44-8563-0B09761289E5}"/>
+              </a:ext>
+            </a:extLst>
+          </p:cNvPr>
           <p:cNvSpPr>
             <a:spLocks noGrp="1"/>
           </p:cNvSpPr>
@@ -13417,40 +13686,124 @@
         </p:nvSpPr>
         <p:spPr/>
         <p:txBody>
-          <a:bodyPr/>
+          <a:bodyPr>
+            <a:normAutofit fontScale="77500" lnSpcReduction="20000"/>
+          </a:bodyPr>
           <a:lstStyle/>
           <a:p>
             <a:r>
               <a:rPr lang="en-US" dirty="0"/>
-              <a:t>Always edit schematics with your grid set to 0.1” or 0.05” – ALWAYS!!!</a:t>
-            </a:r>
-          </a:p>
-          <a:p>
-            <a:r>
-              <a:rPr lang="en-US" dirty="0"/>
-              <a:t>Wires/pins can look connected but not be.</a:t>
+              <a:t>The key to PCB design is attention to detail.</a:t>
             </a:r>
           </a:p>
           <a:p>
             <a:pPr lvl="1"/>
             <a:r>
               <a:rPr lang="en-US" dirty="0"/>
-              <a:t>‘Wiggle’ parts to make sure wires move with them.</a:t>
+              <a:t>Building a real board can take 4 months.</a:t>
             </a:r>
           </a:p>
           <a:p>
             <a:pPr lvl="1"/>
             <a:r>
               <a:rPr lang="en-US" dirty="0"/>
-              <a:t>Check for the green dot.</a:t>
-            </a:r>
+              <a:t>If you make a mistake, it takes 4 months to fix.</a:t>
+            </a:r>
+          </a:p>
+          <a:p>
+            <a:pPr lvl="2"/>
+            <a:r>
+              <a:rPr lang="en-US" dirty="0"/>
+              <a:t>Contrast to software:  just recompile and rerun!</a:t>
+            </a:r>
+          </a:p>
+          <a:p>
+            <a:pPr lvl="1"/>
+            <a:r>
+              <a:rPr lang="en-US" dirty="0"/>
+              <a:t>Don’t make any mistakes!  Check your work!</a:t>
+            </a:r>
+          </a:p>
+          <a:p>
+            <a:r>
+              <a:rPr lang="en-US" dirty="0"/>
+              <a:t>Grading for PCB labs</a:t>
+            </a:r>
+          </a:p>
+          <a:p>
+            <a:pPr lvl="1"/>
+            <a:r>
+              <a:rPr lang="en-US" dirty="0"/>
+              <a:t>A “perfect” score is 10 points</a:t>
+            </a:r>
+          </a:p>
+          <a:p>
+            <a:pPr lvl="1"/>
+            <a:r>
+              <a:rPr lang="en-US" dirty="0"/>
+              <a:t>You start out with 15 points.</a:t>
+            </a:r>
+          </a:p>
+          <a:p>
+            <a:pPr lvl="1"/>
+            <a:r>
+              <a:rPr lang="en-US" dirty="0"/>
+              <a:t>Every time you submit a design to </a:t>
+            </a:r>
+            <a:r>
+              <a:rPr lang="en-US" dirty="0" err="1"/>
+              <a:t>Eaglint</a:t>
+            </a:r>
+            <a:r>
+              <a:rPr lang="en-US" dirty="0"/>
+              <a:t>, you lose a point.</a:t>
+            </a:r>
+          </a:p>
+          <a:p>
+            <a:pPr lvl="1"/>
+            <a:r>
+              <a:rPr lang="en-US" dirty="0"/>
+              <a:t>Every time you submit a design for human review </a:t>
+            </a:r>
+            <a:r>
+              <a:rPr lang="en-US" dirty="0" err="1"/>
+              <a:t>Eaglint</a:t>
+            </a:r>
+            <a:r>
+              <a:rPr lang="en-US" dirty="0"/>
+              <a:t>, you lose a point.</a:t>
+            </a:r>
+          </a:p>
+          <a:p>
+            <a:pPr lvl="1"/>
+            <a:r>
+              <a:rPr lang="en-US"/>
+              <a:t>You </a:t>
+            </a:r>
+            <a:r>
+              <a:rPr lang="en-US" dirty="0"/>
+              <a:t>must complete the labs.</a:t>
+            </a:r>
+          </a:p>
+          <a:p>
+            <a:r>
+              <a:rPr lang="en-US" dirty="0"/>
+              <a:t>”Quick checks” are free.</a:t>
+            </a:r>
+          </a:p>
+          <a:p>
+            <a:pPr lvl="1"/>
+            <a:endParaRPr lang="en-US" dirty="0"/>
+          </a:p>
+          <a:p>
+            <a:endParaRPr lang="en-US" dirty="0"/>
           </a:p>
         </p:txBody>
       </p:sp>
     </p:spTree>
     <p:extLst>
       <p:ext uri="{BB962C8B-B14F-4D97-AF65-F5344CB8AC3E}">
-        <p14:creationId xmlns:p14="http://schemas.microsoft.com/office/powerpoint/2010/main" val="473298508"/>
+        <p14:creationId xmlns:p14="http://schemas.microsoft.com/office/powerpoint/2010/main" val="252210692"/>
       </p:ext>
     </p:extLst>
   </p:cSld>
@@ -13587,1031 +13940,6 @@
 </p:sld>
 </file>
 
-<file path=ppt/slides/slide30.xml><?xml version="1.0" encoding="utf-8"?>
-<p:sld xmlns:a="http://schemas.openxmlformats.org/drawingml/2006/main" xmlns:r="http://schemas.openxmlformats.org/officeDocument/2006/relationships" xmlns:p="http://schemas.openxmlformats.org/presentationml/2006/main">
-  <p:cSld>
-    <p:spTree>
-      <p:nvGrpSpPr>
-        <p:cNvPr id="1" name=""/>
-        <p:cNvGrpSpPr/>
-        <p:nvPr/>
-      </p:nvGrpSpPr>
-      <p:grpSpPr>
-        <a:xfrm>
-          <a:off x="0" y="0"/>
-          <a:ext cx="0" cy="0"/>
-          <a:chOff x="0" y="0"/>
-          <a:chExt cx="0" cy="0"/>
-        </a:xfrm>
-      </p:grpSpPr>
-      <p:sp>
-        <p:nvSpPr>
-          <p:cNvPr id="2" name="Title 1"/>
-          <p:cNvSpPr>
-            <a:spLocks noGrp="1"/>
-          </p:cNvSpPr>
-          <p:nvPr>
-            <p:ph type="ctrTitle"/>
-          </p:nvPr>
-        </p:nvSpPr>
-        <p:spPr/>
-        <p:txBody>
-          <a:bodyPr/>
-          <a:lstStyle/>
-          <a:p>
-            <a:r>
-              <a:rPr lang="en-US" dirty="0"/>
-              <a:t>Board Layout</a:t>
-            </a:r>
-          </a:p>
-        </p:txBody>
-      </p:sp>
-      <p:sp>
-        <p:nvSpPr>
-          <p:cNvPr id="3" name="Subtitle 2"/>
-          <p:cNvSpPr>
-            <a:spLocks noGrp="1"/>
-          </p:cNvSpPr>
-          <p:nvPr>
-            <p:ph type="subTitle" idx="1"/>
-          </p:nvPr>
-        </p:nvSpPr>
-        <p:spPr/>
-        <p:txBody>
-          <a:bodyPr/>
-          <a:lstStyle/>
-          <a:p>
-            <a:endParaRPr lang="en-US" dirty="0"/>
-          </a:p>
-        </p:txBody>
-      </p:sp>
-    </p:spTree>
-    <p:extLst>
-      <p:ext uri="{BB962C8B-B14F-4D97-AF65-F5344CB8AC3E}">
-        <p14:creationId xmlns:p14="http://schemas.microsoft.com/office/powerpoint/2010/main" val="717478419"/>
-      </p:ext>
-    </p:extLst>
-  </p:cSld>
-  <p:clrMapOvr>
-    <a:masterClrMapping/>
-  </p:clrMapOvr>
-</p:sld>
-</file>
-
-<file path=ppt/slides/slide31.xml><?xml version="1.0" encoding="utf-8"?>
-<p:sld xmlns:a="http://schemas.openxmlformats.org/drawingml/2006/main" xmlns:r="http://schemas.openxmlformats.org/officeDocument/2006/relationships" xmlns:p="http://schemas.openxmlformats.org/presentationml/2006/main">
-  <p:cSld>
-    <p:spTree>
-      <p:nvGrpSpPr>
-        <p:cNvPr id="1" name=""/>
-        <p:cNvGrpSpPr/>
-        <p:nvPr/>
-      </p:nvGrpSpPr>
-      <p:grpSpPr>
-        <a:xfrm>
-          <a:off x="0" y="0"/>
-          <a:ext cx="0" cy="0"/>
-          <a:chOff x="0" y="0"/>
-          <a:chExt cx="0" cy="0"/>
-        </a:xfrm>
-      </p:grpSpPr>
-      <p:sp>
-        <p:nvSpPr>
-          <p:cNvPr id="2" name="Title 1"/>
-          <p:cNvSpPr>
-            <a:spLocks noGrp="1"/>
-          </p:cNvSpPr>
-          <p:nvPr>
-            <p:ph type="title"/>
-          </p:nvPr>
-        </p:nvSpPr>
-        <p:spPr/>
-        <p:txBody>
-          <a:bodyPr/>
-          <a:lstStyle/>
-          <a:p>
-            <a:r>
-              <a:rPr lang="en-US" dirty="0"/>
-              <a:t>Board Layout Goals</a:t>
-            </a:r>
-          </a:p>
-        </p:txBody>
-      </p:sp>
-      <p:sp>
-        <p:nvSpPr>
-          <p:cNvPr id="3" name="Content Placeholder 2"/>
-          <p:cNvSpPr>
-            <a:spLocks noGrp="1"/>
-          </p:cNvSpPr>
-          <p:nvPr>
-            <p:ph idx="1"/>
-          </p:nvPr>
-        </p:nvSpPr>
-        <p:spPr/>
-        <p:txBody>
-          <a:bodyPr>
-            <a:normAutofit fontScale="77500" lnSpcReduction="20000"/>
-          </a:bodyPr>
-          <a:lstStyle/>
-          <a:p>
-            <a:r>
-              <a:rPr lang="en-US" dirty="0"/>
-              <a:t>Mechanical constraints – Some things need to be in specific locations</a:t>
-            </a:r>
-          </a:p>
-          <a:p>
-            <a:r>
-              <a:rPr lang="en-US" dirty="0"/>
-              <a:t>Electrical constraints – Does the layout meet signal integrity/EM requirements</a:t>
-            </a:r>
-          </a:p>
-          <a:p>
-            <a:pPr lvl="1"/>
-            <a:r>
-              <a:rPr lang="en-US" dirty="0"/>
-              <a:t>Will digital interference mess up the antenna?</a:t>
-            </a:r>
-          </a:p>
-          <a:p>
-            <a:pPr lvl="1"/>
-            <a:r>
-              <a:rPr lang="en-US" dirty="0"/>
-              <a:t>Are decoupling caps near IC Supply pins?</a:t>
-            </a:r>
-          </a:p>
-          <a:p>
-            <a:pPr lvl="1"/>
-            <a:r>
-              <a:rPr lang="en-US" dirty="0"/>
-              <a:t>Keep the noisy power/ground for the motors away from the digital logic.</a:t>
-            </a:r>
-          </a:p>
-          <a:p>
-            <a:r>
-              <a:rPr lang="en-US" dirty="0"/>
-              <a:t>Correctness – things don’t overlap or hang off the board.</a:t>
-            </a:r>
-          </a:p>
-          <a:p>
-            <a:r>
-              <a:rPr lang="en-US" dirty="0"/>
-              <a:t>Ease of routing – Connected items should be physically close.</a:t>
-            </a:r>
-          </a:p>
-          <a:p>
-            <a:r>
-              <a:rPr lang="en-US" dirty="0"/>
-              <a:t>Make it pretty – you want a nice looking board</a:t>
-            </a:r>
-            <a:endParaRPr lang="en-US" dirty="0">
-              <a:sym typeface="Wingdings"/>
-            </a:endParaRPr>
-          </a:p>
-          <a:p>
-            <a:r>
-              <a:rPr lang="en-US" dirty="0">
-                <a:sym typeface="Wingdings"/>
-              </a:rPr>
-              <a:t>Potentially other, design-specific requirements</a:t>
-            </a:r>
-          </a:p>
-          <a:p>
-            <a:pPr marL="0" indent="0">
-              <a:buNone/>
-            </a:pPr>
-            <a:endParaRPr lang="en-US" dirty="0"/>
-          </a:p>
-        </p:txBody>
-      </p:sp>
-    </p:spTree>
-    <p:extLst>
-      <p:ext uri="{BB962C8B-B14F-4D97-AF65-F5344CB8AC3E}">
-        <p14:creationId xmlns:p14="http://schemas.microsoft.com/office/powerpoint/2010/main" val="250201672"/>
-      </p:ext>
-    </p:extLst>
-  </p:cSld>
-  <p:clrMapOvr>
-    <a:masterClrMapping/>
-  </p:clrMapOvr>
-</p:sld>
-</file>
-
-<file path=ppt/slides/slide32.xml><?xml version="1.0" encoding="utf-8"?>
-<p:sld xmlns:a="http://schemas.openxmlformats.org/drawingml/2006/main" xmlns:r="http://schemas.openxmlformats.org/officeDocument/2006/relationships" xmlns:p="http://schemas.openxmlformats.org/presentationml/2006/main">
-  <p:cSld>
-    <p:spTree>
-      <p:nvGrpSpPr>
-        <p:cNvPr id="1" name=""/>
-        <p:cNvGrpSpPr/>
-        <p:nvPr/>
-      </p:nvGrpSpPr>
-      <p:grpSpPr>
-        <a:xfrm>
-          <a:off x="0" y="0"/>
-          <a:ext cx="0" cy="0"/>
-          <a:chOff x="0" y="0"/>
-          <a:chExt cx="0" cy="0"/>
-        </a:xfrm>
-      </p:grpSpPr>
-      <p:sp>
-        <p:nvSpPr>
-          <p:cNvPr id="2" name="Title 1"/>
-          <p:cNvSpPr>
-            <a:spLocks noGrp="1"/>
-          </p:cNvSpPr>
-          <p:nvPr>
-            <p:ph type="title"/>
-          </p:nvPr>
-        </p:nvSpPr>
-        <p:spPr/>
-        <p:txBody>
-          <a:bodyPr/>
-          <a:lstStyle/>
-          <a:p>
-            <a:r>
-              <a:rPr lang="en-US" dirty="0"/>
-              <a:t>Layout In Eagle</a:t>
-            </a:r>
-          </a:p>
-        </p:txBody>
-      </p:sp>
-      <p:sp>
-        <p:nvSpPr>
-          <p:cNvPr id="3" name="Content Placeholder 2"/>
-          <p:cNvSpPr>
-            <a:spLocks noGrp="1"/>
-          </p:cNvSpPr>
-          <p:nvPr>
-            <p:ph idx="1"/>
-          </p:nvPr>
-        </p:nvSpPr>
-        <p:spPr/>
-        <p:txBody>
-          <a:bodyPr/>
-          <a:lstStyle/>
-          <a:p>
-            <a:r>
-              <a:rPr lang="en-US" dirty="0"/>
-              <a:t>You can put things on the back of the board</a:t>
-            </a:r>
-          </a:p>
-          <a:p>
-            <a:pPr lvl="1"/>
-            <a:r>
-              <a:rPr lang="en-US" dirty="0"/>
-              <a:t>Use the “Mirror” tool.</a:t>
-            </a:r>
-          </a:p>
-          <a:p>
-            <a:pPr lvl="1"/>
-            <a:r>
-              <a:rPr lang="en-US" dirty="0"/>
-              <a:t>This will make assembly harder.</a:t>
-            </a:r>
-          </a:p>
-          <a:p>
-            <a:r>
-              <a:rPr lang="en-US" dirty="0"/>
-              <a:t>You can also move around the reference designator</a:t>
-            </a:r>
-          </a:p>
-          <a:p>
-            <a:pPr lvl="1"/>
-            <a:r>
-              <a:rPr lang="en-US" dirty="0"/>
-              <a:t>Use the “squash” tool</a:t>
-            </a:r>
-          </a:p>
-          <a:p>
-            <a:r>
-              <a:rPr lang="en-US" dirty="0"/>
-              <a:t>You can rotate components with the rotate tool.</a:t>
-            </a:r>
-          </a:p>
-          <a:p>
-            <a:pPr marL="0" indent="0">
-              <a:buNone/>
-            </a:pPr>
-            <a:endParaRPr lang="en-US" dirty="0"/>
-          </a:p>
-        </p:txBody>
-      </p:sp>
-    </p:spTree>
-    <p:extLst>
-      <p:ext uri="{BB962C8B-B14F-4D97-AF65-F5344CB8AC3E}">
-        <p14:creationId xmlns:p14="http://schemas.microsoft.com/office/powerpoint/2010/main" val="847403710"/>
-      </p:ext>
-    </p:extLst>
-  </p:cSld>
-  <p:clrMapOvr>
-    <a:masterClrMapping/>
-  </p:clrMapOvr>
-</p:sld>
-</file>
-
-<file path=ppt/slides/slide33.xml><?xml version="1.0" encoding="utf-8"?>
-<p:sld xmlns:a="http://schemas.openxmlformats.org/drawingml/2006/main" xmlns:r="http://schemas.openxmlformats.org/officeDocument/2006/relationships" xmlns:p="http://schemas.openxmlformats.org/presentationml/2006/main">
-  <p:cSld>
-    <p:spTree>
-      <p:nvGrpSpPr>
-        <p:cNvPr id="1" name=""/>
-        <p:cNvGrpSpPr/>
-        <p:nvPr/>
-      </p:nvGrpSpPr>
-      <p:grpSpPr>
-        <a:xfrm>
-          <a:off x="0" y="0"/>
-          <a:ext cx="0" cy="0"/>
-          <a:chOff x="0" y="0"/>
-          <a:chExt cx="0" cy="0"/>
-        </a:xfrm>
-      </p:grpSpPr>
-      <p:sp>
-        <p:nvSpPr>
-          <p:cNvPr id="2" name="Title 1"/>
-          <p:cNvSpPr>
-            <a:spLocks noGrp="1"/>
-          </p:cNvSpPr>
-          <p:nvPr>
-            <p:ph type="title"/>
-          </p:nvPr>
-        </p:nvSpPr>
-        <p:spPr/>
-        <p:txBody>
-          <a:bodyPr/>
-          <a:lstStyle/>
-          <a:p>
-            <a:r>
-              <a:rPr lang="en-US" dirty="0"/>
-              <a:t>Layout Demo</a:t>
-            </a:r>
-          </a:p>
-        </p:txBody>
-      </p:sp>
-      <p:sp>
-        <p:nvSpPr>
-          <p:cNvPr id="3" name="Content Placeholder 2"/>
-          <p:cNvSpPr>
-            <a:spLocks noGrp="1"/>
-          </p:cNvSpPr>
-          <p:nvPr>
-            <p:ph idx="1"/>
-          </p:nvPr>
-        </p:nvSpPr>
-        <p:spPr/>
-        <p:txBody>
-          <a:bodyPr/>
-          <a:lstStyle/>
-          <a:p>
-            <a:r>
-              <a:rPr lang="en-US" dirty="0"/>
-              <a:t>open /Users/</a:t>
-            </a:r>
-            <a:r>
-              <a:rPr lang="en-US" dirty="0" err="1"/>
-              <a:t>swanson</a:t>
-            </a:r>
-            <a:r>
-              <a:rPr lang="en-US" dirty="0"/>
-              <a:t>/UCSD/Teaching/18sp-190/</a:t>
-            </a:r>
-            <a:r>
-              <a:rPr lang="en-US" dirty="0" err="1"/>
-              <a:t>QuadClass</a:t>
-            </a:r>
-            <a:r>
-              <a:rPr lang="en-US" dirty="0"/>
-              <a:t>-Resources/Lecture\ Slides/Examples/ATmega128RFA1-DevBoard/ATmega128RFA1-DevBoard-unplaced.brd</a:t>
-            </a:r>
-          </a:p>
-        </p:txBody>
-      </p:sp>
-    </p:spTree>
-    <p:extLst>
-      <p:ext uri="{BB962C8B-B14F-4D97-AF65-F5344CB8AC3E}">
-        <p14:creationId xmlns:p14="http://schemas.microsoft.com/office/powerpoint/2010/main" val="2644763162"/>
-      </p:ext>
-    </p:extLst>
-  </p:cSld>
-  <p:clrMapOvr>
-    <a:masterClrMapping/>
-  </p:clrMapOvr>
-</p:sld>
-</file>
-
-<file path=ppt/slides/slide34.xml><?xml version="1.0" encoding="utf-8"?>
-<p:sld xmlns:a="http://schemas.openxmlformats.org/drawingml/2006/main" xmlns:r="http://schemas.openxmlformats.org/officeDocument/2006/relationships" xmlns:p="http://schemas.openxmlformats.org/presentationml/2006/main">
-  <p:cSld>
-    <p:spTree>
-      <p:nvGrpSpPr>
-        <p:cNvPr id="1" name=""/>
-        <p:cNvGrpSpPr/>
-        <p:nvPr/>
-      </p:nvGrpSpPr>
-      <p:grpSpPr>
-        <a:xfrm>
-          <a:off x="0" y="0"/>
-          <a:ext cx="0" cy="0"/>
-          <a:chOff x="0" y="0"/>
-          <a:chExt cx="0" cy="0"/>
-        </a:xfrm>
-      </p:grpSpPr>
-      <p:sp>
-        <p:nvSpPr>
-          <p:cNvPr id="2" name="Title 1"/>
-          <p:cNvSpPr>
-            <a:spLocks noGrp="1"/>
-          </p:cNvSpPr>
-          <p:nvPr>
-            <p:ph type="title"/>
-          </p:nvPr>
-        </p:nvSpPr>
-        <p:spPr/>
-        <p:txBody>
-          <a:bodyPr/>
-          <a:lstStyle/>
-          <a:p>
-            <a:r>
-              <a:rPr lang="en-US" dirty="0"/>
-              <a:t>The Three Ways to Route</a:t>
-            </a:r>
-          </a:p>
-        </p:txBody>
-      </p:sp>
-      <p:sp>
-        <p:nvSpPr>
-          <p:cNvPr id="3" name="Content Placeholder 2"/>
-          <p:cNvSpPr>
-            <a:spLocks noGrp="1"/>
-          </p:cNvSpPr>
-          <p:nvPr>
-            <p:ph idx="1"/>
-          </p:nvPr>
-        </p:nvSpPr>
-        <p:spPr/>
-        <p:txBody>
-          <a:bodyPr>
-            <a:normAutofit fontScale="92500" lnSpcReduction="20000"/>
-          </a:bodyPr>
-          <a:lstStyle/>
-          <a:p>
-            <a:r>
-              <a:rPr lang="en-US" dirty="0"/>
-              <a:t>Manual</a:t>
-            </a:r>
-          </a:p>
-          <a:p>
-            <a:pPr lvl="1"/>
-            <a:r>
-              <a:rPr lang="en-US" dirty="0"/>
-              <a:t>You can do anything you want (including things you shouldn’t)</a:t>
-            </a:r>
-          </a:p>
-          <a:p>
-            <a:r>
-              <a:rPr lang="en-US" dirty="0"/>
-              <a:t>Auto router</a:t>
-            </a:r>
-          </a:p>
-          <a:p>
-            <a:pPr lvl="1"/>
-            <a:r>
-              <a:rPr lang="en-US" dirty="0"/>
-              <a:t>Fully-automatic routing, subject to constraints that you can set.</a:t>
-            </a:r>
-          </a:p>
-          <a:p>
-            <a:r>
-              <a:rPr lang="en-US" dirty="0"/>
-              <a:t>“Follow me”</a:t>
-            </a:r>
-          </a:p>
-          <a:p>
-            <a:pPr lvl="1"/>
-            <a:r>
-              <a:rPr lang="en-US" dirty="0"/>
-              <a:t>Assisted manual routing.  The router will enforce the constraints you set.</a:t>
-            </a:r>
-          </a:p>
-          <a:p>
-            <a:pPr lvl="1"/>
-            <a:r>
-              <a:rPr lang="en-US" dirty="0"/>
-              <a:t>Subject configurable cost functions.</a:t>
-            </a:r>
-          </a:p>
-          <a:p>
-            <a:pPr lvl="1"/>
-            <a:r>
-              <a:rPr lang="en-US" dirty="0"/>
-              <a:t>More control.</a:t>
-            </a:r>
-          </a:p>
-        </p:txBody>
-      </p:sp>
-    </p:spTree>
-    <p:extLst>
-      <p:ext uri="{BB962C8B-B14F-4D97-AF65-F5344CB8AC3E}">
-        <p14:creationId xmlns:p14="http://schemas.microsoft.com/office/powerpoint/2010/main" val="1871447490"/>
-      </p:ext>
-    </p:extLst>
-  </p:cSld>
-  <p:clrMapOvr>
-    <a:masterClrMapping/>
-  </p:clrMapOvr>
-</p:sld>
-</file>
-
-<file path=ppt/slides/slide35.xml><?xml version="1.0" encoding="utf-8"?>
-<p:sld xmlns:a="http://schemas.openxmlformats.org/drawingml/2006/main" xmlns:r="http://schemas.openxmlformats.org/officeDocument/2006/relationships" xmlns:p="http://schemas.openxmlformats.org/presentationml/2006/main">
-  <p:cSld>
-    <p:spTree>
-      <p:nvGrpSpPr>
-        <p:cNvPr id="1" name=""/>
-        <p:cNvGrpSpPr/>
-        <p:nvPr/>
-      </p:nvGrpSpPr>
-      <p:grpSpPr>
-        <a:xfrm>
-          <a:off x="0" y="0"/>
-          <a:ext cx="0" cy="0"/>
-          <a:chOff x="0" y="0"/>
-          <a:chExt cx="0" cy="0"/>
-        </a:xfrm>
-      </p:grpSpPr>
-      <p:sp>
-        <p:nvSpPr>
-          <p:cNvPr id="2" name="Title 1"/>
-          <p:cNvSpPr>
-            <a:spLocks noGrp="1"/>
-          </p:cNvSpPr>
-          <p:nvPr>
-            <p:ph type="title"/>
-          </p:nvPr>
-        </p:nvSpPr>
-        <p:spPr/>
-        <p:txBody>
-          <a:bodyPr/>
-          <a:lstStyle/>
-          <a:p>
-            <a:r>
-              <a:rPr lang="en-US" dirty="0"/>
-              <a:t>Manual Routing Demo</a:t>
-            </a:r>
-          </a:p>
-        </p:txBody>
-      </p:sp>
-      <p:sp>
-        <p:nvSpPr>
-          <p:cNvPr id="3" name="Content Placeholder 2"/>
-          <p:cNvSpPr>
-            <a:spLocks noGrp="1"/>
-          </p:cNvSpPr>
-          <p:nvPr>
-            <p:ph idx="1"/>
-          </p:nvPr>
-        </p:nvSpPr>
-        <p:spPr/>
-        <p:txBody>
-          <a:bodyPr/>
-          <a:lstStyle/>
-          <a:p>
-            <a:endParaRPr lang="en-US"/>
-          </a:p>
-        </p:txBody>
-      </p:sp>
-    </p:spTree>
-    <p:extLst>
-      <p:ext uri="{BB962C8B-B14F-4D97-AF65-F5344CB8AC3E}">
-        <p14:creationId xmlns:p14="http://schemas.microsoft.com/office/powerpoint/2010/main" val="1101629336"/>
-      </p:ext>
-    </p:extLst>
-  </p:cSld>
-  <p:clrMapOvr>
-    <a:masterClrMapping/>
-  </p:clrMapOvr>
-</p:sld>
-</file>
-
-<file path=ppt/slides/slide36.xml><?xml version="1.0" encoding="utf-8"?>
-<p:sld xmlns:a="http://schemas.openxmlformats.org/drawingml/2006/main" xmlns:r="http://schemas.openxmlformats.org/officeDocument/2006/relationships" xmlns:p="http://schemas.openxmlformats.org/presentationml/2006/main">
-  <p:cSld>
-    <p:spTree>
-      <p:nvGrpSpPr>
-        <p:cNvPr id="1" name=""/>
-        <p:cNvGrpSpPr/>
-        <p:nvPr/>
-      </p:nvGrpSpPr>
-      <p:grpSpPr>
-        <a:xfrm>
-          <a:off x="0" y="0"/>
-          <a:ext cx="0" cy="0"/>
-          <a:chOff x="0" y="0"/>
-          <a:chExt cx="0" cy="0"/>
-        </a:xfrm>
-      </p:grpSpPr>
-      <p:sp>
-        <p:nvSpPr>
-          <p:cNvPr id="2" name="Title 1"/>
-          <p:cNvSpPr>
-            <a:spLocks noGrp="1"/>
-          </p:cNvSpPr>
-          <p:nvPr>
-            <p:ph type="title"/>
-          </p:nvPr>
-        </p:nvSpPr>
-        <p:spPr/>
-        <p:txBody>
-          <a:bodyPr/>
-          <a:lstStyle/>
-          <a:p>
-            <a:r>
-              <a:rPr lang="en-US" dirty="0"/>
-              <a:t>Auto Router</a:t>
-            </a:r>
-          </a:p>
-        </p:txBody>
-      </p:sp>
-      <p:sp>
-        <p:nvSpPr>
-          <p:cNvPr id="3" name="Content Placeholder 2"/>
-          <p:cNvSpPr>
-            <a:spLocks noGrp="1"/>
-          </p:cNvSpPr>
-          <p:nvPr>
-            <p:ph idx="1"/>
-          </p:nvPr>
-        </p:nvSpPr>
-        <p:spPr/>
-        <p:txBody>
-          <a:bodyPr>
-            <a:normAutofit fontScale="62500" lnSpcReduction="20000"/>
-          </a:bodyPr>
-          <a:lstStyle/>
-          <a:p>
-            <a:r>
-              <a:rPr lang="en-US" dirty="0"/>
-              <a:t>Mixed reputation</a:t>
-            </a:r>
-          </a:p>
-          <a:p>
-            <a:pPr lvl="1"/>
-            <a:r>
-              <a:rPr lang="en-US" dirty="0"/>
-              <a:t>It can’t do everything</a:t>
-            </a:r>
-          </a:p>
-          <a:p>
-            <a:pPr lvl="1"/>
-            <a:r>
-              <a:rPr lang="en-US" dirty="0"/>
-              <a:t>Sometimes it does a bad job</a:t>
-            </a:r>
-          </a:p>
-          <a:p>
-            <a:pPr lvl="1"/>
-            <a:r>
-              <a:rPr lang="en-US" dirty="0"/>
-              <a:t>When it works, it’s great.</a:t>
-            </a:r>
-          </a:p>
-          <a:p>
-            <a:pPr lvl="1"/>
-            <a:r>
-              <a:rPr lang="en-US" dirty="0"/>
-              <a:t>Usually it needs some touch up.</a:t>
-            </a:r>
-          </a:p>
-          <a:p>
-            <a:r>
-              <a:rPr lang="en-US" dirty="0"/>
-              <a:t>Net classes (“Edit-&gt;Net Classes…”)</a:t>
-            </a:r>
-          </a:p>
-          <a:p>
-            <a:pPr lvl="1"/>
-            <a:r>
-              <a:rPr lang="en-US" dirty="0"/>
-              <a:t>Lets you set parameters for different kinds of nets (mostly width and clearances)</a:t>
-            </a:r>
-          </a:p>
-          <a:p>
-            <a:r>
-              <a:rPr lang="en-US" dirty="0"/>
-              <a:t>Lots of parameters to mess around with </a:t>
-            </a:r>
-          </a:p>
-          <a:p>
-            <a:pPr lvl="1"/>
-            <a:r>
-              <a:rPr lang="en-US" dirty="0"/>
-              <a:t>Optimization phases</a:t>
-            </a:r>
-          </a:p>
-          <a:p>
-            <a:pPr lvl="1"/>
-            <a:r>
-              <a:rPr lang="en-US" dirty="0"/>
-              <a:t>Routing grids </a:t>
-            </a:r>
-          </a:p>
-          <a:p>
-            <a:pPr lvl="1"/>
-            <a:r>
-              <a:rPr lang="en-US" dirty="0"/>
-              <a:t>Effort levels</a:t>
-            </a:r>
-          </a:p>
-          <a:p>
-            <a:pPr lvl="1"/>
-            <a:r>
-              <a:rPr lang="en-US" dirty="0"/>
-              <a:t>Concurrency</a:t>
-            </a:r>
-          </a:p>
-          <a:p>
-            <a:pPr lvl="1"/>
-            <a:r>
-              <a:rPr lang="en-US" dirty="0"/>
-              <a:t>Staged routing</a:t>
-            </a:r>
-          </a:p>
-          <a:p>
-            <a:pPr lvl="1"/>
-            <a:r>
-              <a:rPr lang="en-US" dirty="0"/>
-              <a:t>Checkout the Eagle Manual</a:t>
-            </a:r>
-          </a:p>
-          <a:p>
-            <a:pPr lvl="1"/>
-            <a:endParaRPr lang="en-US" dirty="0"/>
-          </a:p>
-        </p:txBody>
-      </p:sp>
-    </p:spTree>
-    <p:extLst>
-      <p:ext uri="{BB962C8B-B14F-4D97-AF65-F5344CB8AC3E}">
-        <p14:creationId xmlns:p14="http://schemas.microsoft.com/office/powerpoint/2010/main" val="1098705568"/>
-      </p:ext>
-    </p:extLst>
-  </p:cSld>
-  <p:clrMapOvr>
-    <a:masterClrMapping/>
-  </p:clrMapOvr>
-</p:sld>
-</file>
-
-<file path=ppt/slides/slide37.xml><?xml version="1.0" encoding="utf-8"?>
-<p:sld xmlns:a="http://schemas.openxmlformats.org/drawingml/2006/main" xmlns:r="http://schemas.openxmlformats.org/officeDocument/2006/relationships" xmlns:p="http://schemas.openxmlformats.org/presentationml/2006/main">
-  <p:cSld>
-    <p:spTree>
-      <p:nvGrpSpPr>
-        <p:cNvPr id="1" name=""/>
-        <p:cNvGrpSpPr/>
-        <p:nvPr/>
-      </p:nvGrpSpPr>
-      <p:grpSpPr>
-        <a:xfrm>
-          <a:off x="0" y="0"/>
-          <a:ext cx="0" cy="0"/>
-          <a:chOff x="0" y="0"/>
-          <a:chExt cx="0" cy="0"/>
-        </a:xfrm>
-      </p:grpSpPr>
-      <p:sp>
-        <p:nvSpPr>
-          <p:cNvPr id="2" name="Title 1"/>
-          <p:cNvSpPr>
-            <a:spLocks noGrp="1"/>
-          </p:cNvSpPr>
-          <p:nvPr>
-            <p:ph type="title"/>
-          </p:nvPr>
-        </p:nvSpPr>
-        <p:spPr/>
-        <p:txBody>
-          <a:bodyPr/>
-          <a:lstStyle/>
-          <a:p>
-            <a:r>
-              <a:rPr lang="en-US" dirty="0"/>
-              <a:t>Follow Me Router Demo</a:t>
-            </a:r>
-          </a:p>
-        </p:txBody>
-      </p:sp>
-      <p:sp>
-        <p:nvSpPr>
-          <p:cNvPr id="3" name="Content Placeholder 2"/>
-          <p:cNvSpPr>
-            <a:spLocks noGrp="1"/>
-          </p:cNvSpPr>
-          <p:nvPr>
-            <p:ph idx="1"/>
-          </p:nvPr>
-        </p:nvSpPr>
-        <p:spPr/>
-        <p:txBody>
-          <a:bodyPr/>
-          <a:lstStyle/>
-          <a:p>
-            <a:endParaRPr lang="en-US" dirty="0"/>
-          </a:p>
-        </p:txBody>
-      </p:sp>
-    </p:spTree>
-    <p:extLst>
-      <p:ext uri="{BB962C8B-B14F-4D97-AF65-F5344CB8AC3E}">
-        <p14:creationId xmlns:p14="http://schemas.microsoft.com/office/powerpoint/2010/main" val="4292009301"/>
-      </p:ext>
-    </p:extLst>
-  </p:cSld>
-  <p:clrMapOvr>
-    <a:masterClrMapping/>
-  </p:clrMapOvr>
-</p:sld>
-</file>
-
-<file path=ppt/slides/slide38.xml><?xml version="1.0" encoding="utf-8"?>
-<p:sld xmlns:a="http://schemas.openxmlformats.org/drawingml/2006/main" xmlns:r="http://schemas.openxmlformats.org/officeDocument/2006/relationships" xmlns:p="http://schemas.openxmlformats.org/presentationml/2006/main">
-  <p:cSld>
-    <p:spTree>
-      <p:nvGrpSpPr>
-        <p:cNvPr id="1" name=""/>
-        <p:cNvGrpSpPr/>
-        <p:nvPr/>
-      </p:nvGrpSpPr>
-      <p:grpSpPr>
-        <a:xfrm>
-          <a:off x="0" y="0"/>
-          <a:ext cx="0" cy="0"/>
-          <a:chOff x="0" y="0"/>
-          <a:chExt cx="0" cy="0"/>
-        </a:xfrm>
-      </p:grpSpPr>
-      <p:sp>
-        <p:nvSpPr>
-          <p:cNvPr id="2" name="Title 1"/>
-          <p:cNvSpPr>
-            <a:spLocks noGrp="1"/>
-          </p:cNvSpPr>
-          <p:nvPr>
-            <p:ph type="title"/>
-          </p:nvPr>
-        </p:nvSpPr>
-        <p:spPr/>
-        <p:txBody>
-          <a:bodyPr/>
-          <a:lstStyle/>
-          <a:p>
-            <a:r>
-              <a:rPr lang="en-US" dirty="0"/>
-              <a:t>Auto Routing Demo</a:t>
-            </a:r>
-          </a:p>
-        </p:txBody>
-      </p:sp>
-      <p:sp>
-        <p:nvSpPr>
-          <p:cNvPr id="3" name="Content Placeholder 2"/>
-          <p:cNvSpPr>
-            <a:spLocks noGrp="1"/>
-          </p:cNvSpPr>
-          <p:nvPr>
-            <p:ph idx="1"/>
-          </p:nvPr>
-        </p:nvSpPr>
-        <p:spPr/>
-        <p:txBody>
-          <a:bodyPr/>
-          <a:lstStyle/>
-          <a:p>
-            <a:endParaRPr lang="en-US"/>
-          </a:p>
-        </p:txBody>
-      </p:sp>
-    </p:spTree>
-    <p:extLst>
-      <p:ext uri="{BB962C8B-B14F-4D97-AF65-F5344CB8AC3E}">
-        <p14:creationId xmlns:p14="http://schemas.microsoft.com/office/powerpoint/2010/main" val="561162856"/>
-      </p:ext>
-    </p:extLst>
-  </p:cSld>
-  <p:clrMapOvr>
-    <a:masterClrMapping/>
-  </p:clrMapOvr>
-</p:sld>
-</file>
-
-<file path=ppt/slides/slide39.xml><?xml version="1.0" encoding="utf-8"?>
-<p:sld xmlns:a="http://schemas.openxmlformats.org/drawingml/2006/main" xmlns:r="http://schemas.openxmlformats.org/officeDocument/2006/relationships" xmlns:p="http://schemas.openxmlformats.org/presentationml/2006/main">
-  <p:cSld>
-    <p:spTree>
-      <p:nvGrpSpPr>
-        <p:cNvPr id="1" name=""/>
-        <p:cNvGrpSpPr/>
-        <p:nvPr/>
-      </p:nvGrpSpPr>
-      <p:grpSpPr>
-        <a:xfrm>
-          <a:off x="0" y="0"/>
-          <a:ext cx="0" cy="0"/>
-          <a:chOff x="0" y="0"/>
-          <a:chExt cx="0" cy="0"/>
-        </a:xfrm>
-      </p:grpSpPr>
-      <p:sp>
-        <p:nvSpPr>
-          <p:cNvPr id="2" name="Title 1"/>
-          <p:cNvSpPr>
-            <a:spLocks noGrp="1"/>
-          </p:cNvSpPr>
-          <p:nvPr>
-            <p:ph type="title"/>
-          </p:nvPr>
-        </p:nvSpPr>
-        <p:spPr/>
-        <p:txBody>
-          <a:bodyPr/>
-          <a:lstStyle/>
-          <a:p>
-            <a:r>
-              <a:rPr lang="en-US" dirty="0"/>
-              <a:t>Commands for Routing</a:t>
-            </a:r>
-          </a:p>
-        </p:txBody>
-      </p:sp>
-      <p:sp>
-        <p:nvSpPr>
-          <p:cNvPr id="3" name="Content Placeholder 2"/>
-          <p:cNvSpPr>
-            <a:spLocks noGrp="1"/>
-          </p:cNvSpPr>
-          <p:nvPr>
-            <p:ph idx="1"/>
-          </p:nvPr>
-        </p:nvSpPr>
-        <p:spPr/>
-        <p:txBody>
-          <a:bodyPr>
-            <a:normAutofit/>
-          </a:bodyPr>
-          <a:lstStyle/>
-          <a:p>
-            <a:r>
-              <a:rPr lang="en-US" dirty="0"/>
-              <a:t>“Auto;” – run the auto router (leave off the “;” to configure the router.</a:t>
-            </a:r>
-          </a:p>
-          <a:p>
-            <a:r>
-              <a:rPr lang="en-US" dirty="0"/>
-              <a:t>“</a:t>
-            </a:r>
-            <a:r>
-              <a:rPr lang="en-US" dirty="0" err="1"/>
-              <a:t>Ripup</a:t>
-            </a:r>
-            <a:r>
-              <a:rPr lang="en-US" dirty="0"/>
-              <a:t>;” – </a:t>
-            </a:r>
-            <a:r>
-              <a:rPr lang="en-US" dirty="0" err="1"/>
-              <a:t>unroute</a:t>
-            </a:r>
-            <a:r>
-              <a:rPr lang="en-US" dirty="0"/>
-              <a:t> signals</a:t>
-            </a:r>
-          </a:p>
-          <a:p>
-            <a:r>
-              <a:rPr lang="en-US" dirty="0"/>
-              <a:t>“Show &lt;thing&gt;” – Highlight a net or part</a:t>
-            </a:r>
-          </a:p>
-          <a:p>
-            <a:pPr lvl="1"/>
-            <a:endParaRPr lang="en-US" dirty="0"/>
-          </a:p>
-        </p:txBody>
-      </p:sp>
-    </p:spTree>
-    <p:extLst>
-      <p:ext uri="{BB962C8B-B14F-4D97-AF65-F5344CB8AC3E}">
-        <p14:creationId xmlns:p14="http://schemas.microsoft.com/office/powerpoint/2010/main" val="199760183"/>
-      </p:ext>
-    </p:extLst>
-  </p:cSld>
-  <p:clrMapOvr>
-    <a:masterClrMapping/>
-  </p:clrMapOvr>
-</p:sld>
-</file>
-
 <file path=ppt/slides/slide4.xml><?xml version="1.0" encoding="utf-8"?>
 <p:sld xmlns:a="http://schemas.openxmlformats.org/drawingml/2006/main" xmlns:r="http://schemas.openxmlformats.org/officeDocument/2006/relationships" xmlns:p="http://schemas.openxmlformats.org/presentationml/2006/main">
   <p:cSld>
@@ -14799,1070 +14127,6 @@
     <p:extLst>
       <p:ext uri="{BB962C8B-B14F-4D97-AF65-F5344CB8AC3E}">
         <p14:creationId xmlns:p14="http://schemas.microsoft.com/office/powerpoint/2010/main" val="2840438103"/>
-      </p:ext>
-    </p:extLst>
-  </p:cSld>
-  <p:clrMapOvr>
-    <a:masterClrMapping/>
-  </p:clrMapOvr>
-</p:sld>
-</file>
-
-<file path=ppt/slides/slide40.xml><?xml version="1.0" encoding="utf-8"?>
-<p:sld xmlns:a="http://schemas.openxmlformats.org/drawingml/2006/main" xmlns:r="http://schemas.openxmlformats.org/officeDocument/2006/relationships" xmlns:p="http://schemas.openxmlformats.org/presentationml/2006/main">
-  <p:cSld>
-    <p:spTree>
-      <p:nvGrpSpPr>
-        <p:cNvPr id="1" name=""/>
-        <p:cNvGrpSpPr/>
-        <p:nvPr/>
-      </p:nvGrpSpPr>
-      <p:grpSpPr>
-        <a:xfrm>
-          <a:off x="0" y="0"/>
-          <a:ext cx="0" cy="0"/>
-          <a:chOff x="0" y="0"/>
-          <a:chExt cx="0" cy="0"/>
-        </a:xfrm>
-      </p:grpSpPr>
-      <p:sp>
-        <p:nvSpPr>
-          <p:cNvPr id="2" name="Title 1"/>
-          <p:cNvSpPr>
-            <a:spLocks noGrp="1"/>
-          </p:cNvSpPr>
-          <p:nvPr>
-            <p:ph type="title"/>
-          </p:nvPr>
-        </p:nvSpPr>
-        <p:spPr/>
-        <p:txBody>
-          <a:bodyPr/>
-          <a:lstStyle/>
-          <a:p>
-            <a:r>
-              <a:rPr lang="en-US" dirty="0"/>
-              <a:t>Electrical Rules Check</a:t>
-            </a:r>
-          </a:p>
-        </p:txBody>
-      </p:sp>
-      <p:sp>
-        <p:nvSpPr>
-          <p:cNvPr id="3" name="Content Placeholder 2"/>
-          <p:cNvSpPr>
-            <a:spLocks noGrp="1"/>
-          </p:cNvSpPr>
-          <p:nvPr>
-            <p:ph idx="1"/>
-          </p:nvPr>
-        </p:nvSpPr>
-        <p:spPr/>
-        <p:txBody>
-          <a:bodyPr/>
-          <a:lstStyle/>
-          <a:p>
-            <a:r>
-              <a:rPr lang="en-US" dirty="0"/>
-              <a:t>This checks for common problems in schematics.</a:t>
-            </a:r>
-          </a:p>
-          <a:p>
-            <a:r>
-              <a:rPr lang="en-US" dirty="0"/>
-              <a:t>Make sure you understand the reason for the errors.</a:t>
-            </a:r>
-          </a:p>
-          <a:p>
-            <a:r>
-              <a:rPr lang="en-US" dirty="0"/>
-              <a:t>Fix them if you can.</a:t>
-            </a:r>
-          </a:p>
-          <a:p>
-            <a:endParaRPr lang="en-US" dirty="0"/>
-          </a:p>
-          <a:p>
-            <a:r>
-              <a:rPr lang="en-US" dirty="0"/>
-              <a:t>Run it! </a:t>
-            </a:r>
-          </a:p>
-        </p:txBody>
-      </p:sp>
-    </p:spTree>
-    <p:extLst>
-      <p:ext uri="{BB962C8B-B14F-4D97-AF65-F5344CB8AC3E}">
-        <p14:creationId xmlns:p14="http://schemas.microsoft.com/office/powerpoint/2010/main" val="1342602792"/>
-      </p:ext>
-    </p:extLst>
-  </p:cSld>
-  <p:clrMapOvr>
-    <a:masterClrMapping/>
-  </p:clrMapOvr>
-</p:sld>
-</file>
-
-<file path=ppt/slides/slide41.xml><?xml version="1.0" encoding="utf-8"?>
-<p:sld xmlns:a="http://schemas.openxmlformats.org/drawingml/2006/main" xmlns:r="http://schemas.openxmlformats.org/officeDocument/2006/relationships" xmlns:p="http://schemas.openxmlformats.org/presentationml/2006/main">
-  <p:cSld>
-    <p:spTree>
-      <p:nvGrpSpPr>
-        <p:cNvPr id="1" name=""/>
-        <p:cNvGrpSpPr/>
-        <p:nvPr/>
-      </p:nvGrpSpPr>
-      <p:grpSpPr>
-        <a:xfrm>
-          <a:off x="0" y="0"/>
-          <a:ext cx="0" cy="0"/>
-          <a:chOff x="0" y="0"/>
-          <a:chExt cx="0" cy="0"/>
-        </a:xfrm>
-      </p:grpSpPr>
-      <p:sp>
-        <p:nvSpPr>
-          <p:cNvPr id="2" name="Title 1"/>
-          <p:cNvSpPr>
-            <a:spLocks noGrp="1"/>
-          </p:cNvSpPr>
-          <p:nvPr>
-            <p:ph type="title"/>
-          </p:nvPr>
-        </p:nvSpPr>
-        <p:spPr/>
-        <p:txBody>
-          <a:bodyPr/>
-          <a:lstStyle/>
-          <a:p>
-            <a:r>
-              <a:rPr lang="en-US" dirty="0"/>
-              <a:t>Design Rules Check</a:t>
-            </a:r>
-          </a:p>
-        </p:txBody>
-      </p:sp>
-      <p:sp>
-        <p:nvSpPr>
-          <p:cNvPr id="3" name="Content Placeholder 2"/>
-          <p:cNvSpPr>
-            <a:spLocks noGrp="1"/>
-          </p:cNvSpPr>
-          <p:nvPr>
-            <p:ph idx="1"/>
-          </p:nvPr>
-        </p:nvSpPr>
-        <p:spPr/>
-        <p:txBody>
-          <a:bodyPr/>
-          <a:lstStyle/>
-          <a:p>
-            <a:r>
-              <a:rPr lang="en-US" dirty="0"/>
-              <a:t>Checks that your board layout meets design requirements for manufacturing.</a:t>
-            </a:r>
-          </a:p>
-          <a:p>
-            <a:pPr lvl="1"/>
-            <a:r>
-              <a:rPr lang="en-US" dirty="0"/>
-              <a:t>Distance between traces and traces, traces and </a:t>
-            </a:r>
-            <a:r>
-              <a:rPr lang="en-US" dirty="0" err="1"/>
-              <a:t>vias</a:t>
-            </a:r>
-            <a:r>
-              <a:rPr lang="en-US" dirty="0"/>
-              <a:t>, etc.</a:t>
-            </a:r>
-          </a:p>
-          <a:p>
-            <a:pPr lvl="1"/>
-            <a:r>
-              <a:rPr lang="en-US" dirty="0"/>
-              <a:t>Trace width</a:t>
-            </a:r>
-          </a:p>
-          <a:p>
-            <a:pPr lvl="1"/>
-            <a:r>
-              <a:rPr lang="en-US" dirty="0"/>
-              <a:t>Etc.</a:t>
-            </a:r>
-          </a:p>
-          <a:p>
-            <a:pPr lvl="1"/>
-            <a:endParaRPr lang="en-US" dirty="0"/>
-          </a:p>
-        </p:txBody>
-      </p:sp>
-    </p:spTree>
-    <p:extLst>
-      <p:ext uri="{BB962C8B-B14F-4D97-AF65-F5344CB8AC3E}">
-        <p14:creationId xmlns:p14="http://schemas.microsoft.com/office/powerpoint/2010/main" val="638521074"/>
-      </p:ext>
-    </p:extLst>
-  </p:cSld>
-  <p:clrMapOvr>
-    <a:masterClrMapping/>
-  </p:clrMapOvr>
-</p:sld>
-</file>
-
-<file path=ppt/slides/slide42.xml><?xml version="1.0" encoding="utf-8"?>
-<p:sld xmlns:a="http://schemas.openxmlformats.org/drawingml/2006/main" xmlns:r="http://schemas.openxmlformats.org/officeDocument/2006/relationships" xmlns:p="http://schemas.openxmlformats.org/presentationml/2006/main">
-  <p:cSld>
-    <p:spTree>
-      <p:nvGrpSpPr>
-        <p:cNvPr id="1" name=""/>
-        <p:cNvGrpSpPr/>
-        <p:nvPr/>
-      </p:nvGrpSpPr>
-      <p:grpSpPr>
-        <a:xfrm>
-          <a:off x="0" y="0"/>
-          <a:ext cx="0" cy="0"/>
-          <a:chOff x="0" y="0"/>
-          <a:chExt cx="0" cy="0"/>
-        </a:xfrm>
-      </p:grpSpPr>
-      <p:sp>
-        <p:nvSpPr>
-          <p:cNvPr id="2" name="Title 1"/>
-          <p:cNvSpPr>
-            <a:spLocks noGrp="1"/>
-          </p:cNvSpPr>
-          <p:nvPr>
-            <p:ph type="title"/>
-          </p:nvPr>
-        </p:nvSpPr>
-        <p:spPr/>
-        <p:txBody>
-          <a:bodyPr/>
-          <a:lstStyle/>
-          <a:p>
-            <a:r>
-              <a:rPr lang="en-US" dirty="0"/>
-              <a:t>CAM Layers (Gerber files)</a:t>
-            </a:r>
-          </a:p>
-        </p:txBody>
-      </p:sp>
-      <p:sp>
-        <p:nvSpPr>
-          <p:cNvPr id="3" name="Content Placeholder 2"/>
-          <p:cNvSpPr>
-            <a:spLocks noGrp="1"/>
-          </p:cNvSpPr>
-          <p:nvPr>
-            <p:ph idx="1"/>
-          </p:nvPr>
-        </p:nvSpPr>
-        <p:spPr>
-          <a:xfrm>
-            <a:off x="457200" y="1195294"/>
-            <a:ext cx="8229600" cy="5468471"/>
-          </a:xfrm>
-        </p:spPr>
-        <p:txBody>
-          <a:bodyPr>
-            <a:normAutofit fontScale="62500" lnSpcReduction="20000"/>
-          </a:bodyPr>
-          <a:lstStyle/>
-          <a:p>
-            <a:r>
-              <a:rPr lang="en-US" dirty="0"/>
-              <a:t>Eagle layers are for design.</a:t>
-            </a:r>
-          </a:p>
-          <a:p>
-            <a:r>
-              <a:rPr lang="en-US" dirty="0"/>
-              <a:t>CAM layers are for manufacturing</a:t>
-            </a:r>
-          </a:p>
-          <a:p>
-            <a:pPr lvl="1"/>
-            <a:r>
-              <a:rPr lang="en-US" dirty="0"/>
-              <a:t>“Gerber” files are for lithographic steps</a:t>
-            </a:r>
-          </a:p>
-          <a:p>
-            <a:pPr lvl="1"/>
-            <a:r>
-              <a:rPr lang="en-US" dirty="0"/>
-              <a:t>Drill files are for drilling holes.</a:t>
-            </a:r>
-          </a:p>
-          <a:p>
-            <a:r>
-              <a:rPr lang="en-US" dirty="0"/>
-              <a:t>Each CAM layers corresponds to one layer of the resulting board</a:t>
-            </a:r>
-          </a:p>
-          <a:p>
-            <a:pPr lvl="1"/>
-            <a:r>
-              <a:rPr lang="en-US" dirty="0"/>
-              <a:t>Top silk screen (.PLC)</a:t>
-            </a:r>
-          </a:p>
-          <a:p>
-            <a:pPr lvl="1"/>
-            <a:r>
-              <a:rPr lang="en-US" dirty="0"/>
-              <a:t>Top solder mask (.STC)</a:t>
-            </a:r>
-          </a:p>
-          <a:p>
-            <a:pPr lvl="1"/>
-            <a:r>
-              <a:rPr lang="en-US" dirty="0"/>
-              <a:t>Top metal (.TOP)</a:t>
-            </a:r>
-          </a:p>
-          <a:p>
-            <a:pPr lvl="1"/>
-            <a:r>
-              <a:rPr lang="en-US" dirty="0"/>
-              <a:t>Inner metal layers</a:t>
-            </a:r>
-          </a:p>
-          <a:p>
-            <a:pPr lvl="1"/>
-            <a:r>
-              <a:rPr lang="en-US" dirty="0"/>
-              <a:t>Bottom metal (.BOT)</a:t>
-            </a:r>
-          </a:p>
-          <a:p>
-            <a:pPr lvl="1"/>
-            <a:r>
-              <a:rPr lang="en-US" dirty="0"/>
-              <a:t>Bottom solder mask (.STS)</a:t>
-            </a:r>
-          </a:p>
-          <a:p>
-            <a:pPr lvl="1"/>
-            <a:r>
-              <a:rPr lang="en-US" dirty="0"/>
-              <a:t>Bottom silk screen (.PLS)</a:t>
-            </a:r>
-          </a:p>
-          <a:p>
-            <a:pPr lvl="1"/>
-            <a:r>
-              <a:rPr lang="en-US" dirty="0"/>
-              <a:t>Different board houses have different suffixes.</a:t>
-            </a:r>
-          </a:p>
-          <a:p>
-            <a:r>
-              <a:rPr lang="en-US" dirty="0"/>
-              <a:t>One drill file specifying where all the pads, </a:t>
-            </a:r>
-            <a:r>
-              <a:rPr lang="en-US" dirty="0" err="1"/>
-              <a:t>vias</a:t>
-            </a:r>
-            <a:r>
-              <a:rPr lang="en-US" dirty="0"/>
-              <a:t>, and mounting holes are located and their diameters (.DRD)</a:t>
-            </a:r>
-          </a:p>
-          <a:p>
-            <a:r>
-              <a:rPr lang="en-US" dirty="0"/>
-              <a:t>Other files too, depending on the manufacturing process</a:t>
-            </a:r>
-          </a:p>
-          <a:p>
-            <a:pPr lvl="1"/>
-            <a:r>
-              <a:rPr lang="en-US" dirty="0"/>
-              <a:t>Solder paste stencil</a:t>
-            </a:r>
-          </a:p>
-          <a:p>
-            <a:pPr lvl="1"/>
-            <a:r>
-              <a:rPr lang="en-US" dirty="0"/>
-              <a:t>Assembly drawings</a:t>
-            </a:r>
-          </a:p>
-        </p:txBody>
-      </p:sp>
-    </p:spTree>
-    <p:extLst>
-      <p:ext uri="{BB962C8B-B14F-4D97-AF65-F5344CB8AC3E}">
-        <p14:creationId xmlns:p14="http://schemas.microsoft.com/office/powerpoint/2010/main" val="1454318617"/>
-      </p:ext>
-    </p:extLst>
-  </p:cSld>
-  <p:clrMapOvr>
-    <a:masterClrMapping/>
-  </p:clrMapOvr>
-</p:sld>
-</file>
-
-<file path=ppt/slides/slide43.xml><?xml version="1.0" encoding="utf-8"?>
-<p:sld xmlns:a="http://schemas.openxmlformats.org/drawingml/2006/main" xmlns:r="http://schemas.openxmlformats.org/officeDocument/2006/relationships" xmlns:p="http://schemas.openxmlformats.org/presentationml/2006/main">
-  <p:cSld>
-    <p:spTree>
-      <p:nvGrpSpPr>
-        <p:cNvPr id="1" name=""/>
-        <p:cNvGrpSpPr/>
-        <p:nvPr/>
-      </p:nvGrpSpPr>
-      <p:grpSpPr>
-        <a:xfrm>
-          <a:off x="0" y="0"/>
-          <a:ext cx="0" cy="0"/>
-          <a:chOff x="0" y="0"/>
-          <a:chExt cx="0" cy="0"/>
-        </a:xfrm>
-      </p:grpSpPr>
-      <p:sp>
-        <p:nvSpPr>
-          <p:cNvPr id="2" name="Title 1"/>
-          <p:cNvSpPr>
-            <a:spLocks noGrp="1"/>
-          </p:cNvSpPr>
-          <p:nvPr>
-            <p:ph type="title"/>
-          </p:nvPr>
-        </p:nvSpPr>
-        <p:spPr/>
-        <p:txBody>
-          <a:bodyPr/>
-          <a:lstStyle/>
-          <a:p>
-            <a:r>
-              <a:rPr lang="en-US" dirty="0"/>
-              <a:t>The CAM Processor</a:t>
-            </a:r>
-          </a:p>
-        </p:txBody>
-      </p:sp>
-      <p:sp>
-        <p:nvSpPr>
-          <p:cNvPr id="3" name="Content Placeholder 2"/>
-          <p:cNvSpPr>
-            <a:spLocks noGrp="1"/>
-          </p:cNvSpPr>
-          <p:nvPr>
-            <p:ph idx="1"/>
-          </p:nvPr>
-        </p:nvSpPr>
-        <p:spPr/>
-        <p:txBody>
-          <a:bodyPr/>
-          <a:lstStyle/>
-          <a:p>
-            <a:r>
-              <a:rPr lang="en-US" dirty="0"/>
-              <a:t>The CAM Processor generates CAM files</a:t>
-            </a:r>
-          </a:p>
-          <a:p>
-            <a:r>
-              <a:rPr lang="en-US" dirty="0"/>
-              <a:t>The exact configuration for the </a:t>
-            </a:r>
-            <a:r>
-              <a:rPr lang="en-US" dirty="0" err="1"/>
-              <a:t>gerber</a:t>
-            </a:r>
-            <a:r>
-              <a:rPr lang="en-US" dirty="0"/>
-              <a:t> files varies by board house</a:t>
-            </a:r>
-          </a:p>
-          <a:p>
-            <a:pPr lvl="1"/>
-            <a:r>
-              <a:rPr lang="en-US" dirty="0"/>
-              <a:t>Should the board outline be in every layer?</a:t>
-            </a:r>
-          </a:p>
-          <a:p>
-            <a:pPr lvl="1"/>
-            <a:r>
-              <a:rPr lang="en-US" dirty="0"/>
-              <a:t>Which format should the files be in (there are many)</a:t>
-            </a:r>
-          </a:p>
-          <a:p>
-            <a:pPr lvl="1"/>
-            <a:r>
-              <a:rPr lang="en-US" dirty="0"/>
-              <a:t>Should the back side layers be mirrored?</a:t>
-            </a:r>
-          </a:p>
-          <a:p>
-            <a:pPr lvl="1"/>
-            <a:endParaRPr lang="en-US" dirty="0"/>
-          </a:p>
-        </p:txBody>
-      </p:sp>
-    </p:spTree>
-    <p:extLst>
-      <p:ext uri="{BB962C8B-B14F-4D97-AF65-F5344CB8AC3E}">
-        <p14:creationId xmlns:p14="http://schemas.microsoft.com/office/powerpoint/2010/main" val="3909963707"/>
-      </p:ext>
-    </p:extLst>
-  </p:cSld>
-  <p:clrMapOvr>
-    <a:masterClrMapping/>
-  </p:clrMapOvr>
-</p:sld>
-</file>
-
-<file path=ppt/slides/slide44.xml><?xml version="1.0" encoding="utf-8"?>
-<p:sld xmlns:a="http://schemas.openxmlformats.org/drawingml/2006/main" xmlns:r="http://schemas.openxmlformats.org/officeDocument/2006/relationships" xmlns:p="http://schemas.openxmlformats.org/presentationml/2006/main">
-  <p:cSld>
-    <p:spTree>
-      <p:nvGrpSpPr>
-        <p:cNvPr id="1" name=""/>
-        <p:cNvGrpSpPr/>
-        <p:nvPr/>
-      </p:nvGrpSpPr>
-      <p:grpSpPr>
-        <a:xfrm>
-          <a:off x="0" y="0"/>
-          <a:ext cx="0" cy="0"/>
-          <a:chOff x="0" y="0"/>
-          <a:chExt cx="0" cy="0"/>
-        </a:xfrm>
-      </p:grpSpPr>
-      <p:sp>
-        <p:nvSpPr>
-          <p:cNvPr id="2" name="Title 1"/>
-          <p:cNvSpPr>
-            <a:spLocks noGrp="1"/>
-          </p:cNvSpPr>
-          <p:nvPr>
-            <p:ph type="title"/>
-          </p:nvPr>
-        </p:nvSpPr>
-        <p:spPr/>
-        <p:txBody>
-          <a:bodyPr/>
-          <a:lstStyle/>
-          <a:p>
-            <a:r>
-              <a:rPr lang="en-US" dirty="0"/>
-              <a:t>CAM Setup</a:t>
-            </a:r>
-          </a:p>
-        </p:txBody>
-      </p:sp>
-      <p:sp>
-        <p:nvSpPr>
-          <p:cNvPr id="3" name="Content Placeholder 2"/>
-          <p:cNvSpPr>
-            <a:spLocks noGrp="1"/>
-          </p:cNvSpPr>
-          <p:nvPr>
-            <p:ph idx="1"/>
-          </p:nvPr>
-        </p:nvSpPr>
-        <p:spPr/>
-        <p:txBody>
-          <a:bodyPr/>
-          <a:lstStyle/>
-          <a:p>
-            <a:r>
-              <a:rPr lang="en-US" dirty="0"/>
-              <a:t>To prepare </a:t>
-            </a:r>
-            <a:r>
-              <a:rPr lang="en-US" dirty="0" err="1"/>
-              <a:t>Gerbers</a:t>
-            </a:r>
-            <a:r>
-              <a:rPr lang="en-US" dirty="0"/>
-              <a:t> for a particular board house, you need CAM setup files (*.cam for Eagle)</a:t>
-            </a:r>
-          </a:p>
-          <a:p>
-            <a:r>
-              <a:rPr lang="en-US" dirty="0"/>
-              <a:t>This specifies how to generate each layer the board house needs.</a:t>
-            </a:r>
-          </a:p>
-          <a:p>
-            <a:r>
-              <a:rPr lang="en-US" dirty="0"/>
-              <a:t>See example in Button and </a:t>
-            </a:r>
-            <a:r>
-              <a:rPr lang="en-US"/>
-              <a:t>Light Tutorial.</a:t>
-            </a:r>
-          </a:p>
-        </p:txBody>
-      </p:sp>
-    </p:spTree>
-    <p:extLst>
-      <p:ext uri="{BB962C8B-B14F-4D97-AF65-F5344CB8AC3E}">
-        <p14:creationId xmlns:p14="http://schemas.microsoft.com/office/powerpoint/2010/main" val="2385978848"/>
-      </p:ext>
-    </p:extLst>
-  </p:cSld>
-  <p:clrMapOvr>
-    <a:masterClrMapping/>
-  </p:clrMapOvr>
-</p:sld>
-</file>
-
-<file path=ppt/slides/slide45.xml><?xml version="1.0" encoding="utf-8"?>
-<p:sld xmlns:a="http://schemas.openxmlformats.org/drawingml/2006/main" xmlns:r="http://schemas.openxmlformats.org/officeDocument/2006/relationships" xmlns:p="http://schemas.openxmlformats.org/presentationml/2006/main">
-  <p:cSld>
-    <p:spTree>
-      <p:nvGrpSpPr>
-        <p:cNvPr id="1" name=""/>
-        <p:cNvGrpSpPr/>
-        <p:nvPr/>
-      </p:nvGrpSpPr>
-      <p:grpSpPr>
-        <a:xfrm>
-          <a:off x="0" y="0"/>
-          <a:ext cx="0" cy="0"/>
-          <a:chOff x="0" y="0"/>
-          <a:chExt cx="0" cy="0"/>
-        </a:xfrm>
-      </p:grpSpPr>
-      <p:sp>
-        <p:nvSpPr>
-          <p:cNvPr id="2" name="Title 1"/>
-          <p:cNvSpPr>
-            <a:spLocks noGrp="1"/>
-          </p:cNvSpPr>
-          <p:nvPr>
-            <p:ph type="title"/>
-          </p:nvPr>
-        </p:nvSpPr>
-        <p:spPr/>
-        <p:txBody>
-          <a:bodyPr/>
-          <a:lstStyle/>
-          <a:p>
-            <a:r>
-              <a:rPr lang="en-US" dirty="0"/>
-              <a:t>CAM Demo</a:t>
-            </a:r>
-          </a:p>
-        </p:txBody>
-      </p:sp>
-      <p:sp>
-        <p:nvSpPr>
-          <p:cNvPr id="3" name="Content Placeholder 2"/>
-          <p:cNvSpPr>
-            <a:spLocks noGrp="1"/>
-          </p:cNvSpPr>
-          <p:nvPr>
-            <p:ph idx="1"/>
-          </p:nvPr>
-        </p:nvSpPr>
-        <p:spPr/>
-        <p:txBody>
-          <a:bodyPr/>
-          <a:lstStyle/>
-          <a:p>
-            <a:endParaRPr lang="en-US"/>
-          </a:p>
-        </p:txBody>
-      </p:sp>
-    </p:spTree>
-    <p:extLst>
-      <p:ext uri="{BB962C8B-B14F-4D97-AF65-F5344CB8AC3E}">
-        <p14:creationId xmlns:p14="http://schemas.microsoft.com/office/powerpoint/2010/main" val="4080650690"/>
-      </p:ext>
-    </p:extLst>
-  </p:cSld>
-  <p:clrMapOvr>
-    <a:masterClrMapping/>
-  </p:clrMapOvr>
-</p:sld>
-</file>
-
-<file path=ppt/slides/slide46.xml><?xml version="1.0" encoding="utf-8"?>
-<p:sld xmlns:a="http://schemas.openxmlformats.org/drawingml/2006/main" xmlns:r="http://schemas.openxmlformats.org/officeDocument/2006/relationships" xmlns:p="http://schemas.openxmlformats.org/presentationml/2006/main">
-  <p:cSld>
-    <p:spTree>
-      <p:nvGrpSpPr>
-        <p:cNvPr id="1" name=""/>
-        <p:cNvGrpSpPr/>
-        <p:nvPr/>
-      </p:nvGrpSpPr>
-      <p:grpSpPr>
-        <a:xfrm>
-          <a:off x="0" y="0"/>
-          <a:ext cx="0" cy="0"/>
-          <a:chOff x="0" y="0"/>
-          <a:chExt cx="0" cy="0"/>
-        </a:xfrm>
-      </p:grpSpPr>
-      <p:sp>
-        <p:nvSpPr>
-          <p:cNvPr id="2" name="Title 1"/>
-          <p:cNvSpPr>
-            <a:spLocks noGrp="1"/>
-          </p:cNvSpPr>
-          <p:nvPr>
-            <p:ph type="title"/>
-          </p:nvPr>
-        </p:nvSpPr>
-        <p:spPr/>
-        <p:txBody>
-          <a:bodyPr/>
-          <a:lstStyle/>
-          <a:p>
-            <a:r>
-              <a:rPr lang="en-US" dirty="0"/>
-              <a:t>Checking Your </a:t>
-            </a:r>
-            <a:r>
-              <a:rPr lang="en-US" dirty="0" err="1"/>
-              <a:t>Gerbers</a:t>
-            </a:r>
-            <a:r>
-              <a:rPr lang="en-US" dirty="0"/>
-              <a:t>!</a:t>
-            </a:r>
-          </a:p>
-        </p:txBody>
-      </p:sp>
-      <p:sp>
-        <p:nvSpPr>
-          <p:cNvPr id="3" name="Content Placeholder 2"/>
-          <p:cNvSpPr>
-            <a:spLocks noGrp="1"/>
-          </p:cNvSpPr>
-          <p:nvPr>
-            <p:ph idx="1"/>
-          </p:nvPr>
-        </p:nvSpPr>
-        <p:spPr/>
-        <p:txBody>
-          <a:bodyPr/>
-          <a:lstStyle/>
-          <a:p>
-            <a:r>
-              <a:rPr lang="en-US" dirty="0"/>
-              <a:t>Eagle can’t display Gerber files itself</a:t>
-            </a:r>
-          </a:p>
-          <a:p>
-            <a:r>
-              <a:rPr lang="en-US" dirty="0"/>
-              <a:t>You need a 3</a:t>
-            </a:r>
-            <a:r>
-              <a:rPr lang="en-US" baseline="30000" dirty="0"/>
-              <a:t>rd</a:t>
-            </a:r>
-            <a:r>
-              <a:rPr lang="en-US" dirty="0"/>
-              <a:t> party tool</a:t>
-            </a:r>
-          </a:p>
-          <a:p>
-            <a:pPr lvl="1"/>
-            <a:r>
-              <a:rPr lang="en-US" dirty="0"/>
-              <a:t>See the Button and Light tutorial for recommendations</a:t>
-            </a:r>
-          </a:p>
-          <a:p>
-            <a:r>
-              <a:rPr lang="en-US" dirty="0"/>
-              <a:t>You should always check your </a:t>
-            </a:r>
-            <a:r>
-              <a:rPr lang="en-US" dirty="0" err="1"/>
-              <a:t>Gerbers</a:t>
-            </a:r>
-            <a:r>
-              <a:rPr lang="en-US" dirty="0"/>
-              <a:t>!</a:t>
-            </a:r>
-          </a:p>
-          <a:p>
-            <a:pPr lvl="1"/>
-            <a:r>
-              <a:rPr lang="en-US" dirty="0"/>
-              <a:t>Eagle has bugs (I assume)</a:t>
-            </a:r>
-          </a:p>
-          <a:p>
-            <a:pPr lvl="1"/>
-            <a:r>
-              <a:rPr lang="en-US" dirty="0"/>
-              <a:t>You may have misconfigured something</a:t>
-            </a:r>
-          </a:p>
-          <a:p>
-            <a:pPr lvl="1"/>
-            <a:r>
-              <a:rPr lang="en-US" dirty="0"/>
-              <a:t>You may have put something in the wrong layer.</a:t>
-            </a:r>
-          </a:p>
-          <a:p>
-            <a:pPr lvl="1"/>
-            <a:endParaRPr lang="en-US" dirty="0"/>
-          </a:p>
-          <a:p>
-            <a:endParaRPr lang="en-US" dirty="0"/>
-          </a:p>
-        </p:txBody>
-      </p:sp>
-    </p:spTree>
-    <p:extLst>
-      <p:ext uri="{BB962C8B-B14F-4D97-AF65-F5344CB8AC3E}">
-        <p14:creationId xmlns:p14="http://schemas.microsoft.com/office/powerpoint/2010/main" val="2466621111"/>
-      </p:ext>
-    </p:extLst>
-  </p:cSld>
-  <p:clrMapOvr>
-    <a:masterClrMapping/>
-  </p:clrMapOvr>
-</p:sld>
-</file>
-
-<file path=ppt/slides/slide47.xml><?xml version="1.0" encoding="utf-8"?>
-<p:sld xmlns:a="http://schemas.openxmlformats.org/drawingml/2006/main" xmlns:r="http://schemas.openxmlformats.org/officeDocument/2006/relationships" xmlns:p="http://schemas.openxmlformats.org/presentationml/2006/main">
-  <p:cSld>
-    <p:spTree>
-      <p:nvGrpSpPr>
-        <p:cNvPr id="1" name=""/>
-        <p:cNvGrpSpPr/>
-        <p:nvPr/>
-      </p:nvGrpSpPr>
-      <p:grpSpPr>
-        <a:xfrm>
-          <a:off x="0" y="0"/>
-          <a:ext cx="0" cy="0"/>
-          <a:chOff x="0" y="0"/>
-          <a:chExt cx="0" cy="0"/>
-        </a:xfrm>
-      </p:grpSpPr>
-      <p:sp>
-        <p:nvSpPr>
-          <p:cNvPr id="2" name="Title 1"/>
-          <p:cNvSpPr>
-            <a:spLocks noGrp="1"/>
-          </p:cNvSpPr>
-          <p:nvPr>
-            <p:ph type="title"/>
-          </p:nvPr>
-        </p:nvSpPr>
-        <p:spPr/>
-        <p:txBody>
-          <a:bodyPr/>
-          <a:lstStyle/>
-          <a:p>
-            <a:r>
-              <a:rPr lang="en-US" dirty="0"/>
-              <a:t>Gerber Viewer Demo</a:t>
-            </a:r>
-          </a:p>
-        </p:txBody>
-      </p:sp>
-      <p:sp>
-        <p:nvSpPr>
-          <p:cNvPr id="3" name="Content Placeholder 2"/>
-          <p:cNvSpPr>
-            <a:spLocks noGrp="1"/>
-          </p:cNvSpPr>
-          <p:nvPr>
-            <p:ph idx="1"/>
-          </p:nvPr>
-        </p:nvSpPr>
-        <p:spPr/>
-        <p:txBody>
-          <a:bodyPr/>
-          <a:lstStyle/>
-          <a:p>
-            <a:endParaRPr lang="en-US" dirty="0"/>
-          </a:p>
-        </p:txBody>
-      </p:sp>
-    </p:spTree>
-    <p:extLst>
-      <p:ext uri="{BB962C8B-B14F-4D97-AF65-F5344CB8AC3E}">
-        <p14:creationId xmlns:p14="http://schemas.microsoft.com/office/powerpoint/2010/main" val="86481886"/>
-      </p:ext>
-    </p:extLst>
-  </p:cSld>
-  <p:clrMapOvr>
-    <a:masterClrMapping/>
-  </p:clrMapOvr>
-</p:sld>
-</file>
-
-<file path=ppt/slides/slide48.xml><?xml version="1.0" encoding="utf-8"?>
-<p:sld xmlns:a="http://schemas.openxmlformats.org/drawingml/2006/main" xmlns:r="http://schemas.openxmlformats.org/officeDocument/2006/relationships" xmlns:p="http://schemas.openxmlformats.org/presentationml/2006/main">
-  <p:cSld>
-    <p:spTree>
-      <p:nvGrpSpPr>
-        <p:cNvPr id="1" name=""/>
-        <p:cNvGrpSpPr/>
-        <p:nvPr/>
-      </p:nvGrpSpPr>
-      <p:grpSpPr>
-        <a:xfrm>
-          <a:off x="0" y="0"/>
-          <a:ext cx="0" cy="0"/>
-          <a:chOff x="0" y="0"/>
-          <a:chExt cx="0" cy="0"/>
-        </a:xfrm>
-      </p:grpSpPr>
-      <p:sp>
-        <p:nvSpPr>
-          <p:cNvPr id="2" name="Title 1"/>
-          <p:cNvSpPr>
-            <a:spLocks noGrp="1"/>
-          </p:cNvSpPr>
-          <p:nvPr>
-            <p:ph type="title"/>
-          </p:nvPr>
-        </p:nvSpPr>
-        <p:spPr/>
-        <p:txBody>
-          <a:bodyPr/>
-          <a:lstStyle/>
-          <a:p>
-            <a:r>
-              <a:rPr lang="en-US" dirty="0"/>
-              <a:t>DFM Checks</a:t>
-            </a:r>
-          </a:p>
-        </p:txBody>
-      </p:sp>
-      <p:sp>
-        <p:nvSpPr>
-          <p:cNvPr id="3" name="Content Placeholder 2"/>
-          <p:cNvSpPr>
-            <a:spLocks noGrp="1"/>
-          </p:cNvSpPr>
-          <p:nvPr>
-            <p:ph idx="1"/>
-          </p:nvPr>
-        </p:nvSpPr>
-        <p:spPr/>
-        <p:txBody>
-          <a:bodyPr/>
-          <a:lstStyle/>
-          <a:p>
-            <a:r>
-              <a:rPr lang="en-US" dirty="0"/>
-              <a:t>You should also run a “design for manufacturing” (DFM) check on your </a:t>
-            </a:r>
-            <a:r>
-              <a:rPr lang="en-US" dirty="0" err="1"/>
-              <a:t>Gerbers</a:t>
-            </a:r>
-            <a:r>
-              <a:rPr lang="en-US" dirty="0"/>
-              <a:t>, if possible</a:t>
-            </a:r>
-          </a:p>
-          <a:p>
-            <a:r>
-              <a:rPr lang="en-US" dirty="0" err="1"/>
-              <a:t>Freedfm.com</a:t>
-            </a:r>
-            <a:r>
-              <a:rPr lang="en-US" dirty="0"/>
-              <a:t> will do this for you.</a:t>
-            </a:r>
-          </a:p>
-        </p:txBody>
-      </p:sp>
-    </p:spTree>
-    <p:extLst>
-      <p:ext uri="{BB962C8B-B14F-4D97-AF65-F5344CB8AC3E}">
-        <p14:creationId xmlns:p14="http://schemas.microsoft.com/office/powerpoint/2010/main" val="3331413408"/>
-      </p:ext>
-    </p:extLst>
-  </p:cSld>
-  <p:clrMapOvr>
-    <a:masterClrMapping/>
-  </p:clrMapOvr>
-</p:sld>
-</file>
-
-<file path=ppt/slides/slide49.xml><?xml version="1.0" encoding="utf-8"?>
-<p:sld xmlns:a="http://schemas.openxmlformats.org/drawingml/2006/main" xmlns:r="http://schemas.openxmlformats.org/officeDocument/2006/relationships" xmlns:p="http://schemas.openxmlformats.org/presentationml/2006/main">
-  <p:cSld>
-    <p:spTree>
-      <p:nvGrpSpPr>
-        <p:cNvPr id="1" name=""/>
-        <p:cNvGrpSpPr/>
-        <p:nvPr/>
-      </p:nvGrpSpPr>
-      <p:grpSpPr>
-        <a:xfrm>
-          <a:off x="0" y="0"/>
-          <a:ext cx="0" cy="0"/>
-          <a:chOff x="0" y="0"/>
-          <a:chExt cx="0" cy="0"/>
-        </a:xfrm>
-      </p:grpSpPr>
-      <p:sp>
-        <p:nvSpPr>
-          <p:cNvPr id="2" name="Title 1"/>
-          <p:cNvSpPr>
-            <a:spLocks noGrp="1"/>
-          </p:cNvSpPr>
-          <p:nvPr>
-            <p:ph type="title"/>
-          </p:nvPr>
-        </p:nvSpPr>
-        <p:spPr/>
-        <p:txBody>
-          <a:bodyPr/>
-          <a:lstStyle/>
-          <a:p>
-            <a:r>
-              <a:rPr lang="en-US" dirty="0" err="1"/>
-              <a:t>FreeDFM</a:t>
-            </a:r>
-            <a:r>
-              <a:rPr lang="en-US" dirty="0"/>
-              <a:t> Demo</a:t>
-            </a:r>
-          </a:p>
-        </p:txBody>
-      </p:sp>
-      <p:sp>
-        <p:nvSpPr>
-          <p:cNvPr id="3" name="Content Placeholder 2"/>
-          <p:cNvSpPr>
-            <a:spLocks noGrp="1"/>
-          </p:cNvSpPr>
-          <p:nvPr>
-            <p:ph idx="1"/>
-          </p:nvPr>
-        </p:nvSpPr>
-        <p:spPr/>
-        <p:txBody>
-          <a:bodyPr/>
-          <a:lstStyle/>
-          <a:p>
-            <a:endParaRPr lang="en-US" dirty="0"/>
-          </a:p>
-        </p:txBody>
-      </p:sp>
-    </p:spTree>
-    <p:extLst>
-      <p:ext uri="{BB962C8B-B14F-4D97-AF65-F5344CB8AC3E}">
-        <p14:creationId xmlns:p14="http://schemas.microsoft.com/office/powerpoint/2010/main" val="2869961975"/>
       </p:ext>
     </p:extLst>
   </p:cSld>
@@ -16005,731 +14269,6 @@
     <p:extLst>
       <p:ext uri="{BB962C8B-B14F-4D97-AF65-F5344CB8AC3E}">
         <p14:creationId xmlns:p14="http://schemas.microsoft.com/office/powerpoint/2010/main" val="2242305222"/>
-      </p:ext>
-    </p:extLst>
-  </p:cSld>
-  <p:clrMapOvr>
-    <a:masterClrMapping/>
-  </p:clrMapOvr>
-</p:sld>
-</file>
-
-<file path=ppt/slides/slide50.xml><?xml version="1.0" encoding="utf-8"?>
-<p:sld xmlns:a="http://schemas.openxmlformats.org/drawingml/2006/main" xmlns:r="http://schemas.openxmlformats.org/officeDocument/2006/relationships" xmlns:p="http://schemas.openxmlformats.org/presentationml/2006/main">
-  <p:cSld>
-    <p:spTree>
-      <p:nvGrpSpPr>
-        <p:cNvPr id="1" name=""/>
-        <p:cNvGrpSpPr/>
-        <p:nvPr/>
-      </p:nvGrpSpPr>
-      <p:grpSpPr>
-        <a:xfrm>
-          <a:off x="0" y="0"/>
-          <a:ext cx="0" cy="0"/>
-          <a:chOff x="0" y="0"/>
-          <a:chExt cx="0" cy="0"/>
-        </a:xfrm>
-      </p:grpSpPr>
-      <p:sp>
-        <p:nvSpPr>
-          <p:cNvPr id="2" name="Title 1"/>
-          <p:cNvSpPr>
-            <a:spLocks noGrp="1"/>
-          </p:cNvSpPr>
-          <p:nvPr>
-            <p:ph type="title"/>
-          </p:nvPr>
-        </p:nvSpPr>
-        <p:spPr/>
-        <p:txBody>
-          <a:bodyPr/>
-          <a:lstStyle/>
-          <a:p>
-            <a:r>
-              <a:rPr lang="en-US" dirty="0"/>
-              <a:t>The Lab</a:t>
-            </a:r>
-          </a:p>
-        </p:txBody>
-      </p:sp>
-      <p:sp>
-        <p:nvSpPr>
-          <p:cNvPr id="3" name="Content Placeholder 2"/>
-          <p:cNvSpPr>
-            <a:spLocks noGrp="1"/>
-          </p:cNvSpPr>
-          <p:nvPr>
-            <p:ph idx="1"/>
-          </p:nvPr>
-        </p:nvSpPr>
-        <p:spPr/>
-        <p:txBody>
-          <a:bodyPr/>
-          <a:lstStyle/>
-          <a:p>
-            <a:r>
-              <a:rPr lang="en-US" dirty="0"/>
-              <a:t>Use Eagle to design a simple schematic and board.</a:t>
-            </a:r>
-          </a:p>
-          <a:p>
-            <a:r>
-              <a:rPr lang="en-US" dirty="0"/>
-              <a:t>Run it through the tool flow.</a:t>
-            </a:r>
-          </a:p>
-          <a:p>
-            <a:r>
-              <a:rPr lang="en-US" dirty="0">
-                <a:hlinkClick r:id="rId2"/>
-              </a:rPr>
-              <a:t>https://sites.google.com/a/eng.ucsd.edu/quadcopterclass/labs/lab-2-using-eagle</a:t>
-            </a:r>
-            <a:endParaRPr lang="en-US" dirty="0"/>
-          </a:p>
-          <a:p>
-            <a:endParaRPr lang="en-US" dirty="0"/>
-          </a:p>
-        </p:txBody>
-      </p:sp>
-    </p:spTree>
-    <p:extLst>
-      <p:ext uri="{BB962C8B-B14F-4D97-AF65-F5344CB8AC3E}">
-        <p14:creationId xmlns:p14="http://schemas.microsoft.com/office/powerpoint/2010/main" val="2599178135"/>
-      </p:ext>
-    </p:extLst>
-  </p:cSld>
-  <p:clrMapOvr>
-    <a:masterClrMapping/>
-  </p:clrMapOvr>
-</p:sld>
-</file>
-
-<file path=ppt/slides/slide51.xml><?xml version="1.0" encoding="utf-8"?>
-<p:sld xmlns:a="http://schemas.openxmlformats.org/drawingml/2006/main" xmlns:r="http://schemas.openxmlformats.org/officeDocument/2006/relationships" xmlns:p="http://schemas.openxmlformats.org/presentationml/2006/main">
-  <p:cSld>
-    <p:spTree>
-      <p:nvGrpSpPr>
-        <p:cNvPr id="1" name=""/>
-        <p:cNvGrpSpPr/>
-        <p:nvPr/>
-      </p:nvGrpSpPr>
-      <p:grpSpPr>
-        <a:xfrm>
-          <a:off x="0" y="0"/>
-          <a:ext cx="0" cy="0"/>
-          <a:chOff x="0" y="0"/>
-          <a:chExt cx="0" cy="0"/>
-        </a:xfrm>
-      </p:grpSpPr>
-      <p:sp>
-        <p:nvSpPr>
-          <p:cNvPr id="2" name="Title 1">
-            <a:extLst>
-              <a:ext uri="{FF2B5EF4-FFF2-40B4-BE49-F238E27FC236}">
-                <a16:creationId xmlns:a16="http://schemas.microsoft.com/office/drawing/2014/main" id="{B37E69C4-6D54-194A-85C7-586A0D9A7293}"/>
-              </a:ext>
-            </a:extLst>
-          </p:cNvPr>
-          <p:cNvSpPr>
-            <a:spLocks noGrp="1"/>
-          </p:cNvSpPr>
-          <p:nvPr>
-            <p:ph type="title"/>
-          </p:nvPr>
-        </p:nvSpPr>
-        <p:spPr/>
-        <p:txBody>
-          <a:bodyPr/>
-          <a:lstStyle/>
-          <a:p>
-            <a:r>
-              <a:rPr lang="en-US" dirty="0"/>
-              <a:t>Eagle Lint</a:t>
-            </a:r>
-          </a:p>
-        </p:txBody>
-      </p:sp>
-      <p:sp>
-        <p:nvSpPr>
-          <p:cNvPr id="3" name="Content Placeholder 2">
-            <a:extLst>
-              <a:ext uri="{FF2B5EF4-FFF2-40B4-BE49-F238E27FC236}">
-                <a16:creationId xmlns:a16="http://schemas.microsoft.com/office/drawing/2014/main" id="{BD1A45B9-43FC-BB46-BC02-8DE1D835F9BE}"/>
-              </a:ext>
-            </a:extLst>
-          </p:cNvPr>
-          <p:cNvSpPr>
-            <a:spLocks noGrp="1"/>
-          </p:cNvSpPr>
-          <p:nvPr>
-            <p:ph idx="1"/>
-          </p:nvPr>
-        </p:nvSpPr>
-        <p:spPr/>
-        <p:txBody>
-          <a:bodyPr>
-            <a:normAutofit fontScale="62500" lnSpcReduction="20000"/>
-          </a:bodyPr>
-          <a:lstStyle/>
-          <a:p>
-            <a:r>
-              <a:rPr lang="en-US" dirty="0"/>
-              <a:t>lint:  </a:t>
-            </a:r>
-          </a:p>
-          <a:p>
-            <a:pPr lvl="1"/>
-            <a:r>
-              <a:rPr lang="en-US" i="1" dirty="0"/>
-              <a:t>Tool to check coding standards and other invariants about a computer system.</a:t>
-            </a:r>
-          </a:p>
-          <a:p>
-            <a:r>
-              <a:rPr lang="en-US" dirty="0" err="1"/>
-              <a:t>Eaglint</a:t>
-            </a:r>
-            <a:r>
-              <a:rPr lang="en-US" dirty="0"/>
-              <a:t> will check your libraries, schematics</a:t>
-            </a:r>
-          </a:p>
-          <a:p>
-            <a:pPr lvl="1"/>
-            <a:r>
-              <a:rPr lang="en-US" dirty="0"/>
-              <a:t>Check for common problems</a:t>
-            </a:r>
-          </a:p>
-          <a:p>
-            <a:pPr lvl="1"/>
-            <a:r>
-              <a:rPr lang="en-US" dirty="0"/>
-              <a:t>Check for correctness</a:t>
-            </a:r>
-          </a:p>
-          <a:p>
-            <a:pPr lvl="1"/>
-            <a:r>
-              <a:rPr lang="en-US" dirty="0"/>
-              <a:t>Check for style</a:t>
-            </a:r>
-          </a:p>
-          <a:p>
-            <a:r>
-              <a:rPr lang="en-US" dirty="0"/>
-              <a:t>Also checks for other files in your repo</a:t>
-            </a:r>
-          </a:p>
-          <a:p>
-            <a:pPr lvl="1"/>
-            <a:r>
-              <a:rPr lang="en-US" dirty="0" err="1"/>
-              <a:t>Eaglint</a:t>
-            </a:r>
-            <a:r>
-              <a:rPr lang="en-US" dirty="0"/>
-              <a:t> will tell you what it’s looking for.</a:t>
-            </a:r>
-          </a:p>
-          <a:p>
-            <a:pPr lvl="1"/>
-            <a:r>
-              <a:rPr lang="en-US" dirty="0"/>
-              <a:t>Pay attention.</a:t>
-            </a:r>
-          </a:p>
-          <a:p>
-            <a:r>
-              <a:rPr lang="en-US" dirty="0"/>
-              <a:t>Provides a workflow for me to review your designs and provide feedback.</a:t>
-            </a:r>
-          </a:p>
-          <a:p>
-            <a:r>
-              <a:rPr lang="en-US" dirty="0"/>
-              <a:t>To use</a:t>
-            </a:r>
-          </a:p>
-          <a:p>
-            <a:pPr lvl="1"/>
-            <a:r>
-              <a:rPr lang="en-US" dirty="0"/>
-              <a:t>Visit </a:t>
-            </a:r>
-            <a:r>
-              <a:rPr lang="en-US" dirty="0">
-                <a:hlinkClick r:id="rId2"/>
-              </a:rPr>
-              <a:t>http://eaglint.nvsl.io</a:t>
-            </a:r>
-            <a:endParaRPr lang="en-US" dirty="0"/>
-          </a:p>
-          <a:p>
-            <a:pPr lvl="1"/>
-            <a:r>
-              <a:rPr lang="en-US" dirty="0"/>
-              <a:t>You received a welcome email a couple of nights ago.</a:t>
-            </a:r>
-          </a:p>
-          <a:p>
-            <a:endParaRPr lang="en-US" dirty="0"/>
-          </a:p>
-        </p:txBody>
-      </p:sp>
-    </p:spTree>
-    <p:extLst>
-      <p:ext uri="{BB962C8B-B14F-4D97-AF65-F5344CB8AC3E}">
-        <p14:creationId xmlns:p14="http://schemas.microsoft.com/office/powerpoint/2010/main" val="2361343328"/>
-      </p:ext>
-    </p:extLst>
-  </p:cSld>
-  <p:clrMapOvr>
-    <a:masterClrMapping/>
-  </p:clrMapOvr>
-</p:sld>
-</file>
-
-<file path=ppt/slides/slide52.xml><?xml version="1.0" encoding="utf-8"?>
-<p:sld xmlns:a="http://schemas.openxmlformats.org/drawingml/2006/main" xmlns:r="http://schemas.openxmlformats.org/officeDocument/2006/relationships" xmlns:p="http://schemas.openxmlformats.org/presentationml/2006/main">
-  <p:cSld>
-    <p:spTree>
-      <p:nvGrpSpPr>
-        <p:cNvPr id="1" name=""/>
-        <p:cNvGrpSpPr/>
-        <p:nvPr/>
-      </p:nvGrpSpPr>
-      <p:grpSpPr>
-        <a:xfrm>
-          <a:off x="0" y="0"/>
-          <a:ext cx="0" cy="0"/>
-          <a:chOff x="0" y="0"/>
-          <a:chExt cx="0" cy="0"/>
-        </a:xfrm>
-      </p:grpSpPr>
-      <p:sp>
-        <p:nvSpPr>
-          <p:cNvPr id="2" name="Title 1">
-            <a:extLst>
-              <a:ext uri="{FF2B5EF4-FFF2-40B4-BE49-F238E27FC236}">
-                <a16:creationId xmlns:a16="http://schemas.microsoft.com/office/drawing/2014/main" id="{833E81A3-BF51-5545-AE4A-34E442EE3395}"/>
-              </a:ext>
-            </a:extLst>
-          </p:cNvPr>
-          <p:cNvSpPr>
-            <a:spLocks noGrp="1"/>
-          </p:cNvSpPr>
-          <p:nvPr>
-            <p:ph type="title"/>
-          </p:nvPr>
-        </p:nvSpPr>
-        <p:spPr/>
-        <p:txBody>
-          <a:bodyPr/>
-          <a:lstStyle/>
-          <a:p>
-            <a:r>
-              <a:rPr lang="en-US" dirty="0"/>
-              <a:t>Eagle Lint Process</a:t>
-            </a:r>
-          </a:p>
-        </p:txBody>
-      </p:sp>
-      <p:sp>
-        <p:nvSpPr>
-          <p:cNvPr id="3" name="Content Placeholder 2">
-            <a:extLst>
-              <a:ext uri="{FF2B5EF4-FFF2-40B4-BE49-F238E27FC236}">
-                <a16:creationId xmlns:a16="http://schemas.microsoft.com/office/drawing/2014/main" id="{97DDE2E0-2980-844E-B1DB-CACC04B172FE}"/>
-              </a:ext>
-            </a:extLst>
-          </p:cNvPr>
-          <p:cNvSpPr>
-            <a:spLocks noGrp="1"/>
-          </p:cNvSpPr>
-          <p:nvPr>
-            <p:ph idx="1"/>
-          </p:nvPr>
-        </p:nvSpPr>
-        <p:spPr/>
-        <p:txBody>
-          <a:bodyPr>
-            <a:normAutofit fontScale="85000" lnSpcReduction="20000"/>
-          </a:bodyPr>
-          <a:lstStyle/>
-          <a:p>
-            <a:pPr marL="514350" indent="-514350">
-              <a:buFont typeface="+mj-lt"/>
-              <a:buAutoNum type="arabicPeriod"/>
-            </a:pPr>
-            <a:r>
-              <a:rPr lang="en-US" dirty="0"/>
-              <a:t>Commit and push your changes to </a:t>
-            </a:r>
-            <a:r>
-              <a:rPr lang="en-US" dirty="0" err="1"/>
-              <a:t>github</a:t>
-            </a:r>
-            <a:endParaRPr lang="en-US" dirty="0"/>
-          </a:p>
-          <a:p>
-            <a:pPr marL="514350" indent="-514350">
-              <a:buFont typeface="+mj-lt"/>
-              <a:buAutoNum type="arabicPeriod"/>
-            </a:pPr>
-            <a:r>
-              <a:rPr lang="en-US" dirty="0"/>
-              <a:t>Submit your repo to </a:t>
-            </a:r>
-            <a:r>
-              <a:rPr lang="en-US" dirty="0" err="1"/>
-              <a:t>Eaglint</a:t>
-            </a:r>
-            <a:r>
-              <a:rPr lang="en-US" dirty="0"/>
-              <a:t> for a quick check</a:t>
-            </a:r>
-          </a:p>
-          <a:p>
-            <a:pPr marL="514350" indent="-514350">
-              <a:buFont typeface="+mj-lt"/>
-              <a:buAutoNum type="arabicPeriod"/>
-            </a:pPr>
-            <a:r>
-              <a:rPr lang="en-US" dirty="0">
-                <a:solidFill>
-                  <a:srgbClr val="FF0000"/>
-                </a:solidFill>
-              </a:rPr>
-              <a:t>Submit your repo to </a:t>
-            </a:r>
-            <a:r>
-              <a:rPr lang="en-US" dirty="0" err="1">
-                <a:solidFill>
-                  <a:srgbClr val="FF0000"/>
-                </a:solidFill>
-              </a:rPr>
-              <a:t>Eaglint</a:t>
-            </a:r>
-            <a:r>
-              <a:rPr lang="en-US" dirty="0">
-                <a:solidFill>
-                  <a:srgbClr val="FF0000"/>
-                </a:solidFill>
-              </a:rPr>
-              <a:t> for a full check</a:t>
-            </a:r>
-          </a:p>
-          <a:p>
-            <a:pPr marL="514350" indent="-514350">
-              <a:buFont typeface="+mj-lt"/>
-              <a:buAutoNum type="arabicPeriod"/>
-            </a:pPr>
-            <a:r>
-              <a:rPr lang="en-US" dirty="0"/>
-              <a:t>If warnings/errors</a:t>
-            </a:r>
-          </a:p>
-          <a:p>
-            <a:pPr marL="400050" lvl="1" indent="0">
-              <a:buNone/>
-            </a:pPr>
-            <a:r>
-              <a:rPr lang="en-US" dirty="0"/>
-              <a:t>Fix and </a:t>
-            </a:r>
-            <a:r>
-              <a:rPr lang="en-US" dirty="0" err="1"/>
-              <a:t>goto</a:t>
-            </a:r>
-            <a:r>
-              <a:rPr lang="en-US" dirty="0"/>
-              <a:t> 1.</a:t>
-            </a:r>
-          </a:p>
-          <a:p>
-            <a:pPr marL="400050" lvl="1" indent="0">
-              <a:buNone/>
-            </a:pPr>
-            <a:r>
-              <a:rPr lang="en-US" dirty="0"/>
-              <a:t>Or justify them and </a:t>
-            </a:r>
-            <a:r>
-              <a:rPr lang="en-US" dirty="0" err="1"/>
-              <a:t>goto</a:t>
-            </a:r>
-            <a:r>
-              <a:rPr lang="en-US" dirty="0"/>
-              <a:t> 5</a:t>
-            </a:r>
-          </a:p>
-          <a:p>
-            <a:pPr marL="514350" indent="-514350">
-              <a:buFont typeface="+mj-lt"/>
-              <a:buAutoNum type="arabicPeriod"/>
-            </a:pPr>
-            <a:r>
-              <a:rPr lang="en-US" dirty="0">
-                <a:solidFill>
-                  <a:srgbClr val="FF0000"/>
-                </a:solidFill>
-              </a:rPr>
-              <a:t>Submit for human review</a:t>
-            </a:r>
-          </a:p>
-          <a:p>
-            <a:pPr marL="514350" indent="-514350">
-              <a:buFont typeface="+mj-lt"/>
-              <a:buAutoNum type="arabicPeriod"/>
-            </a:pPr>
-            <a:r>
-              <a:rPr lang="en-US" dirty="0"/>
-              <a:t>If rejected</a:t>
-            </a:r>
-          </a:p>
-          <a:p>
-            <a:pPr marL="400050" lvl="1" indent="0">
-              <a:buNone/>
-            </a:pPr>
-            <a:r>
-              <a:rPr lang="en-US" dirty="0"/>
-              <a:t>Read comments; </a:t>
-            </a:r>
-            <a:r>
-              <a:rPr lang="en-US" dirty="0" err="1"/>
-              <a:t>goto</a:t>
-            </a:r>
-            <a:r>
-              <a:rPr lang="en-US" dirty="0"/>
-              <a:t> 1.</a:t>
-            </a:r>
-          </a:p>
-          <a:p>
-            <a:pPr marL="514350" indent="-514350">
-              <a:buFont typeface="+mj-lt"/>
-              <a:buAutoNum type="arabicPeriod"/>
-            </a:pPr>
-            <a:r>
-              <a:rPr lang="en-US" dirty="0"/>
-              <a:t>Else if accepted</a:t>
-            </a:r>
-          </a:p>
-          <a:p>
-            <a:pPr marL="400050" lvl="1" indent="0">
-              <a:buNone/>
-            </a:pPr>
-            <a:r>
-              <a:rPr lang="en-US" dirty="0" err="1"/>
-              <a:t>Goto</a:t>
-            </a:r>
-            <a:r>
-              <a:rPr lang="en-US" dirty="0"/>
-              <a:t> next lab</a:t>
-            </a:r>
-          </a:p>
-        </p:txBody>
-      </p:sp>
-    </p:spTree>
-    <p:extLst>
-      <p:ext uri="{BB962C8B-B14F-4D97-AF65-F5344CB8AC3E}">
-        <p14:creationId xmlns:p14="http://schemas.microsoft.com/office/powerpoint/2010/main" val="1072275094"/>
-      </p:ext>
-    </p:extLst>
-  </p:cSld>
-  <p:clrMapOvr>
-    <a:masterClrMapping/>
-  </p:clrMapOvr>
-</p:sld>
-</file>
-
-<file path=ppt/slides/slide53.xml><?xml version="1.0" encoding="utf-8"?>
-<p:sld xmlns:a="http://schemas.openxmlformats.org/drawingml/2006/main" xmlns:r="http://schemas.openxmlformats.org/officeDocument/2006/relationships" xmlns:p="http://schemas.openxmlformats.org/presentationml/2006/main">
-  <p:cSld>
-    <p:spTree>
-      <p:nvGrpSpPr>
-        <p:cNvPr id="1" name=""/>
-        <p:cNvGrpSpPr/>
-        <p:nvPr/>
-      </p:nvGrpSpPr>
-      <p:grpSpPr>
-        <a:xfrm>
-          <a:off x="0" y="0"/>
-          <a:ext cx="0" cy="0"/>
-          <a:chOff x="0" y="0"/>
-          <a:chExt cx="0" cy="0"/>
-        </a:xfrm>
-      </p:grpSpPr>
-      <p:sp>
-        <p:nvSpPr>
-          <p:cNvPr id="2" name="Title 1">
-            <a:extLst>
-              <a:ext uri="{FF2B5EF4-FFF2-40B4-BE49-F238E27FC236}">
-                <a16:creationId xmlns:a16="http://schemas.microsoft.com/office/drawing/2014/main" id="{F65CE4FC-EF5F-C444-B1EC-1755D0ED84EF}"/>
-              </a:ext>
-            </a:extLst>
-          </p:cNvPr>
-          <p:cNvSpPr>
-            <a:spLocks noGrp="1"/>
-          </p:cNvSpPr>
-          <p:nvPr>
-            <p:ph type="title"/>
-          </p:nvPr>
-        </p:nvSpPr>
-        <p:spPr/>
-        <p:txBody>
-          <a:bodyPr/>
-          <a:lstStyle/>
-          <a:p>
-            <a:r>
-              <a:rPr lang="en-US" dirty="0"/>
-              <a:t>Grading on PCB Labs</a:t>
-            </a:r>
-          </a:p>
-        </p:txBody>
-      </p:sp>
-      <p:sp>
-        <p:nvSpPr>
-          <p:cNvPr id="3" name="Content Placeholder 2">
-            <a:extLst>
-              <a:ext uri="{FF2B5EF4-FFF2-40B4-BE49-F238E27FC236}">
-                <a16:creationId xmlns:a16="http://schemas.microsoft.com/office/drawing/2014/main" id="{6CAF32E4-A95A-5F44-8563-0B09761289E5}"/>
-              </a:ext>
-            </a:extLst>
-          </p:cNvPr>
-          <p:cNvSpPr>
-            <a:spLocks noGrp="1"/>
-          </p:cNvSpPr>
-          <p:nvPr>
-            <p:ph idx="1"/>
-          </p:nvPr>
-        </p:nvSpPr>
-        <p:spPr/>
-        <p:txBody>
-          <a:bodyPr>
-            <a:normAutofit fontScale="70000" lnSpcReduction="20000"/>
-          </a:bodyPr>
-          <a:lstStyle/>
-          <a:p>
-            <a:r>
-              <a:rPr lang="en-US" dirty="0"/>
-              <a:t>The key to PCB design is attention to detail.</a:t>
-            </a:r>
-          </a:p>
-          <a:p>
-            <a:pPr lvl="1"/>
-            <a:r>
-              <a:rPr lang="en-US" dirty="0"/>
-              <a:t>Building a real board can take 4 months.</a:t>
-            </a:r>
-          </a:p>
-          <a:p>
-            <a:pPr lvl="1"/>
-            <a:r>
-              <a:rPr lang="en-US" dirty="0"/>
-              <a:t>If you make a mistake, it takes 4 months to fix.</a:t>
-            </a:r>
-          </a:p>
-          <a:p>
-            <a:pPr lvl="2"/>
-            <a:r>
-              <a:rPr lang="en-US" dirty="0"/>
-              <a:t>Contrast to software:  just recompile and rerun!</a:t>
-            </a:r>
-          </a:p>
-          <a:p>
-            <a:pPr lvl="1"/>
-            <a:r>
-              <a:rPr lang="en-US" dirty="0"/>
-              <a:t>Don’t make any mistakes!  Check your work!</a:t>
-            </a:r>
-          </a:p>
-          <a:p>
-            <a:r>
-              <a:rPr lang="en-US" dirty="0"/>
-              <a:t>Grading for PCB labs</a:t>
-            </a:r>
-          </a:p>
-          <a:p>
-            <a:pPr lvl="1"/>
-            <a:r>
-              <a:rPr lang="en-US" dirty="0"/>
-              <a:t>A “perfect” score is 10 points</a:t>
-            </a:r>
-          </a:p>
-          <a:p>
-            <a:pPr lvl="1"/>
-            <a:r>
-              <a:rPr lang="en-US" dirty="0"/>
-              <a:t>You start out with 15 points.</a:t>
-            </a:r>
-          </a:p>
-          <a:p>
-            <a:pPr lvl="1"/>
-            <a:r>
-              <a:rPr lang="en-US" dirty="0"/>
-              <a:t>Every time you submit a design to </a:t>
-            </a:r>
-            <a:r>
-              <a:rPr lang="en-US" dirty="0" err="1"/>
-              <a:t>Eaglint</a:t>
-            </a:r>
-            <a:r>
-              <a:rPr lang="en-US" dirty="0"/>
-              <a:t>, you lose a point.</a:t>
-            </a:r>
-          </a:p>
-          <a:p>
-            <a:pPr lvl="1"/>
-            <a:r>
-              <a:rPr lang="en-US" dirty="0"/>
-              <a:t>Every time you submit a design for human review </a:t>
-            </a:r>
-            <a:r>
-              <a:rPr lang="en-US" dirty="0" err="1"/>
-              <a:t>Eaglint</a:t>
-            </a:r>
-            <a:r>
-              <a:rPr lang="en-US" dirty="0"/>
-              <a:t>, you lose a point.</a:t>
-            </a:r>
-          </a:p>
-          <a:p>
-            <a:pPr lvl="1"/>
-            <a:r>
-              <a:rPr lang="en-US" dirty="0"/>
-              <a:t>For every day late, you lose a point.</a:t>
-            </a:r>
-          </a:p>
-          <a:p>
-            <a:pPr lvl="1"/>
-            <a:r>
-              <a:rPr lang="en-US"/>
-              <a:t>You must complete the labs.</a:t>
-            </a:r>
-            <a:endParaRPr lang="en-US" dirty="0"/>
-          </a:p>
-          <a:p>
-            <a:r>
-              <a:rPr lang="en-US" dirty="0"/>
-              <a:t>”Quick checks” are free.</a:t>
-            </a:r>
-          </a:p>
-          <a:p>
-            <a:pPr lvl="1"/>
-            <a:endParaRPr lang="en-US" dirty="0"/>
-          </a:p>
-          <a:p>
-            <a:endParaRPr lang="en-US" dirty="0"/>
-          </a:p>
-        </p:txBody>
-      </p:sp>
-    </p:spTree>
-    <p:extLst>
-      <p:ext uri="{BB962C8B-B14F-4D97-AF65-F5344CB8AC3E}">
-        <p14:creationId xmlns:p14="http://schemas.microsoft.com/office/powerpoint/2010/main" val="252210692"/>
       </p:ext>
     </p:extLst>
   </p:cSld>

</xml_diff>

<commit_message>
port over the rest of the labs
</commit_message>
<xml_diff>
--- a/Lecture Slides/Lab01-Eagle-Intro.pptx
+++ b/Lecture Slides/Lab01-Eagle-Intro.pptx
@@ -236,7 +236,7 @@
           <a:p>
             <a:fld id="{BC745CAF-6697-EB43-8D33-148B2A11868D}" type="datetimeFigureOut">
               <a:rPr lang="en-US" smtClean="0"/>
-              <a:t>1/22/19</a:t>
+              <a:t>2/21/19</a:t>
             </a:fld>
             <a:endParaRPr lang="en-US"/>
           </a:p>
@@ -769,7 +769,7 @@
           <a:p>
             <a:fld id="{0675A308-8787-9B42-956E-CA40C2F0F6AE}" type="datetimeFigureOut">
               <a:rPr lang="en-US" smtClean="0"/>
-              <a:t>1/22/19</a:t>
+              <a:t>2/21/19</a:t>
             </a:fld>
             <a:endParaRPr lang="en-US"/>
           </a:p>
@@ -939,7 +939,7 @@
           <a:p>
             <a:fld id="{0675A308-8787-9B42-956E-CA40C2F0F6AE}" type="datetimeFigureOut">
               <a:rPr lang="en-US" smtClean="0"/>
-              <a:t>1/22/19</a:t>
+              <a:t>2/21/19</a:t>
             </a:fld>
             <a:endParaRPr lang="en-US"/>
           </a:p>
@@ -1119,7 +1119,7 @@
           <a:p>
             <a:fld id="{0675A308-8787-9B42-956E-CA40C2F0F6AE}" type="datetimeFigureOut">
               <a:rPr lang="en-US" smtClean="0"/>
-              <a:t>1/22/19</a:t>
+              <a:t>2/21/19</a:t>
             </a:fld>
             <a:endParaRPr lang="en-US"/>
           </a:p>
@@ -1289,7 +1289,7 @@
           <a:p>
             <a:fld id="{0675A308-8787-9B42-956E-CA40C2F0F6AE}" type="datetimeFigureOut">
               <a:rPr lang="en-US" smtClean="0"/>
-              <a:t>1/22/19</a:t>
+              <a:t>2/21/19</a:t>
             </a:fld>
             <a:endParaRPr lang="en-US"/>
           </a:p>
@@ -1535,7 +1535,7 @@
           <a:p>
             <a:fld id="{0675A308-8787-9B42-956E-CA40C2F0F6AE}" type="datetimeFigureOut">
               <a:rPr lang="en-US" smtClean="0"/>
-              <a:t>1/22/19</a:t>
+              <a:t>2/21/19</a:t>
             </a:fld>
             <a:endParaRPr lang="en-US"/>
           </a:p>
@@ -1823,7 +1823,7 @@
           <a:p>
             <a:fld id="{0675A308-8787-9B42-956E-CA40C2F0F6AE}" type="datetimeFigureOut">
               <a:rPr lang="en-US" smtClean="0"/>
-              <a:t>1/22/19</a:t>
+              <a:t>2/21/19</a:t>
             </a:fld>
             <a:endParaRPr lang="en-US"/>
           </a:p>
@@ -2245,7 +2245,7 @@
           <a:p>
             <a:fld id="{0675A308-8787-9B42-956E-CA40C2F0F6AE}" type="datetimeFigureOut">
               <a:rPr lang="en-US" smtClean="0"/>
-              <a:t>1/22/19</a:t>
+              <a:t>2/21/19</a:t>
             </a:fld>
             <a:endParaRPr lang="en-US"/>
           </a:p>
@@ -2363,7 +2363,7 @@
           <a:p>
             <a:fld id="{0675A308-8787-9B42-956E-CA40C2F0F6AE}" type="datetimeFigureOut">
               <a:rPr lang="en-US" smtClean="0"/>
-              <a:t>1/22/19</a:t>
+              <a:t>2/21/19</a:t>
             </a:fld>
             <a:endParaRPr lang="en-US"/>
           </a:p>
@@ -2458,7 +2458,7 @@
           <a:p>
             <a:fld id="{0675A308-8787-9B42-956E-CA40C2F0F6AE}" type="datetimeFigureOut">
               <a:rPr lang="en-US" smtClean="0"/>
-              <a:t>1/22/19</a:t>
+              <a:t>2/21/19</a:t>
             </a:fld>
             <a:endParaRPr lang="en-US"/>
           </a:p>
@@ -2735,7 +2735,7 @@
           <a:p>
             <a:fld id="{0675A308-8787-9B42-956E-CA40C2F0F6AE}" type="datetimeFigureOut">
               <a:rPr lang="en-US" smtClean="0"/>
-              <a:t>1/22/19</a:t>
+              <a:t>2/21/19</a:t>
             </a:fld>
             <a:endParaRPr lang="en-US"/>
           </a:p>
@@ -2988,7 +2988,7 @@
           <a:p>
             <a:fld id="{0675A308-8787-9B42-956E-CA40C2F0F6AE}" type="datetimeFigureOut">
               <a:rPr lang="en-US" smtClean="0"/>
-              <a:t>1/22/19</a:t>
+              <a:t>2/21/19</a:t>
             </a:fld>
             <a:endParaRPr lang="en-US"/>
           </a:p>
@@ -3201,7 +3201,7 @@
           <a:p>
             <a:fld id="{0675A308-8787-9B42-956E-CA40C2F0F6AE}" type="datetimeFigureOut">
               <a:rPr lang="en-US" smtClean="0"/>
-              <a:t>1/22/19</a:t>
+              <a:t>2/21/19</a:t>
             </a:fld>
             <a:endParaRPr lang="en-US"/>
           </a:p>
@@ -4000,7 +4000,7 @@
 </file>
 
 <file path=ppt/slides/slide13.xml><?xml version="1.0" encoding="utf-8"?>
-<p:sld xmlns:a="http://schemas.openxmlformats.org/drawingml/2006/main" xmlns:r="http://schemas.openxmlformats.org/officeDocument/2006/relationships" xmlns:p="http://schemas.openxmlformats.org/presentationml/2006/main">
+<p:sld xmlns:a="http://schemas.openxmlformats.org/drawingml/2006/main" xmlns:r="http://schemas.openxmlformats.org/officeDocument/2006/relationships" xmlns:p="http://schemas.openxmlformats.org/presentationml/2006/main" show="0">
   <p:cSld>
     <p:spTree>
       <p:nvGrpSpPr>
@@ -11960,7 +11960,7 @@
 </file>
 
 <file path=ppt/slides/slide18.xml><?xml version="1.0" encoding="utf-8"?>
-<p:sld xmlns:a="http://schemas.openxmlformats.org/drawingml/2006/main" xmlns:r="http://schemas.openxmlformats.org/officeDocument/2006/relationships" xmlns:p="http://schemas.openxmlformats.org/presentationml/2006/main">
+<p:sld xmlns:a="http://schemas.openxmlformats.org/drawingml/2006/main" xmlns:r="http://schemas.openxmlformats.org/officeDocument/2006/relationships" xmlns:p="http://schemas.openxmlformats.org/presentationml/2006/main" show="0">
   <p:cSld>
     <p:spTree>
       <p:nvGrpSpPr>
@@ -12121,29 +12121,7 @@
           <a:p>
             <a:r>
               <a:rPr lang="en-US" dirty="0"/>
-              <a:t>The “Red board”</a:t>
-            </a:r>
-          </a:p>
-          <a:p>
-            <a:r>
-              <a:rPr lang="en-US" dirty="0"/>
-              <a:t>open /Users/</a:t>
-            </a:r>
-            <a:r>
-              <a:rPr lang="en-US" dirty="0" err="1"/>
-              <a:t>swanson</a:t>
-            </a:r>
-            <a:r>
-              <a:rPr lang="en-US" dirty="0"/>
-              <a:t>/UCSD/Teaching/18sp-190/</a:t>
-            </a:r>
-            <a:r>
-              <a:rPr lang="en-US" dirty="0" err="1"/>
-              <a:t>QuadClass</a:t>
-            </a:r>
-            <a:r>
-              <a:rPr lang="en-US" dirty="0"/>
-              <a:t>-Resources/Lecture\ Slides/Examples/ATmega128RFA1-DevBoard/ATmega128RFA1-DevBoard.brd</a:t>
+              <a:t>Quadcopter remote</a:t>
             </a:r>
           </a:p>
         </p:txBody>
@@ -13007,7 +12985,7 @@
 </file>
 
 <file path=ppt/slides/slide25.xml><?xml version="1.0" encoding="utf-8"?>
-<p:sld xmlns:a="http://schemas.openxmlformats.org/drawingml/2006/main" xmlns:r="http://schemas.openxmlformats.org/officeDocument/2006/relationships" xmlns:p="http://schemas.openxmlformats.org/presentationml/2006/main">
+<p:sld xmlns:a="http://schemas.openxmlformats.org/drawingml/2006/main" xmlns:r="http://schemas.openxmlformats.org/officeDocument/2006/relationships" xmlns:p="http://schemas.openxmlformats.org/presentationml/2006/main" show="0">
   <p:cSld>
     <p:spTree>
       <p:nvGrpSpPr>

</xml_diff>